<commit_message>
docs : Modify table_discription.pptx
일부 제약조건 수정 완료
데이터 타입 수정 필요
</commit_message>
<xml_diff>
--- a/table_discription.pptx
+++ b/table_discription.pptx
@@ -259,7 +259,7 @@
           <a:p>
             <a:fld id="{3CE49807-2488-4122-88C7-4F4612F935D3}" type="datetimeFigureOut">
               <a:rPr lang="ko-KR" altLang="en-US" smtClean="0"/>
-              <a:t>2021-04-21</a:t>
+              <a:t>2021-04-22</a:t>
             </a:fld>
             <a:endParaRPr lang="ko-KR" altLang="en-US"/>
           </a:p>
@@ -457,7 +457,7 @@
           <a:p>
             <a:fld id="{3CE49807-2488-4122-88C7-4F4612F935D3}" type="datetimeFigureOut">
               <a:rPr lang="ko-KR" altLang="en-US" smtClean="0"/>
-              <a:t>2021-04-21</a:t>
+              <a:t>2021-04-22</a:t>
             </a:fld>
             <a:endParaRPr lang="ko-KR" altLang="en-US"/>
           </a:p>
@@ -665,7 +665,7 @@
           <a:p>
             <a:fld id="{3CE49807-2488-4122-88C7-4F4612F935D3}" type="datetimeFigureOut">
               <a:rPr lang="ko-KR" altLang="en-US" smtClean="0"/>
-              <a:t>2021-04-21</a:t>
+              <a:t>2021-04-22</a:t>
             </a:fld>
             <a:endParaRPr lang="ko-KR" altLang="en-US"/>
           </a:p>
@@ -863,7 +863,7 @@
           <a:p>
             <a:fld id="{3CE49807-2488-4122-88C7-4F4612F935D3}" type="datetimeFigureOut">
               <a:rPr lang="ko-KR" altLang="en-US" smtClean="0"/>
-              <a:t>2021-04-21</a:t>
+              <a:t>2021-04-22</a:t>
             </a:fld>
             <a:endParaRPr lang="ko-KR" altLang="en-US"/>
           </a:p>
@@ -1138,7 +1138,7 @@
           <a:p>
             <a:fld id="{3CE49807-2488-4122-88C7-4F4612F935D3}" type="datetimeFigureOut">
               <a:rPr lang="ko-KR" altLang="en-US" smtClean="0"/>
-              <a:t>2021-04-21</a:t>
+              <a:t>2021-04-22</a:t>
             </a:fld>
             <a:endParaRPr lang="ko-KR" altLang="en-US"/>
           </a:p>
@@ -1403,7 +1403,7 @@
           <a:p>
             <a:fld id="{3CE49807-2488-4122-88C7-4F4612F935D3}" type="datetimeFigureOut">
               <a:rPr lang="ko-KR" altLang="en-US" smtClean="0"/>
-              <a:t>2021-04-21</a:t>
+              <a:t>2021-04-22</a:t>
             </a:fld>
             <a:endParaRPr lang="ko-KR" altLang="en-US"/>
           </a:p>
@@ -1815,7 +1815,7 @@
           <a:p>
             <a:fld id="{3CE49807-2488-4122-88C7-4F4612F935D3}" type="datetimeFigureOut">
               <a:rPr lang="ko-KR" altLang="en-US" smtClean="0"/>
-              <a:t>2021-04-21</a:t>
+              <a:t>2021-04-22</a:t>
             </a:fld>
             <a:endParaRPr lang="ko-KR" altLang="en-US"/>
           </a:p>
@@ -1956,7 +1956,7 @@
           <a:p>
             <a:fld id="{3CE49807-2488-4122-88C7-4F4612F935D3}" type="datetimeFigureOut">
               <a:rPr lang="ko-KR" altLang="en-US" smtClean="0"/>
-              <a:t>2021-04-21</a:t>
+              <a:t>2021-04-22</a:t>
             </a:fld>
             <a:endParaRPr lang="ko-KR" altLang="en-US"/>
           </a:p>
@@ -2069,7 +2069,7 @@
           <a:p>
             <a:fld id="{3CE49807-2488-4122-88C7-4F4612F935D3}" type="datetimeFigureOut">
               <a:rPr lang="ko-KR" altLang="en-US" smtClean="0"/>
-              <a:t>2021-04-21</a:t>
+              <a:t>2021-04-22</a:t>
             </a:fld>
             <a:endParaRPr lang="ko-KR" altLang="en-US"/>
           </a:p>
@@ -2380,7 +2380,7 @@
           <a:p>
             <a:fld id="{3CE49807-2488-4122-88C7-4F4612F935D3}" type="datetimeFigureOut">
               <a:rPr lang="ko-KR" altLang="en-US" smtClean="0"/>
-              <a:t>2021-04-21</a:t>
+              <a:t>2021-04-22</a:t>
             </a:fld>
             <a:endParaRPr lang="ko-KR" altLang="en-US"/>
           </a:p>
@@ -2668,7 +2668,7 @@
           <a:p>
             <a:fld id="{3CE49807-2488-4122-88C7-4F4612F935D3}" type="datetimeFigureOut">
               <a:rPr lang="ko-KR" altLang="en-US" smtClean="0"/>
-              <a:t>2021-04-21</a:t>
+              <a:t>2021-04-22</a:t>
             </a:fld>
             <a:endParaRPr lang="ko-KR" altLang="en-US"/>
           </a:p>
@@ -2909,7 +2909,7 @@
           <a:p>
             <a:fld id="{3CE49807-2488-4122-88C7-4F4612F935D3}" type="datetimeFigureOut">
               <a:rPr lang="ko-KR" altLang="en-US" smtClean="0"/>
-              <a:t>2021-04-21</a:t>
+              <a:t>2021-04-22</a:t>
             </a:fld>
             <a:endParaRPr lang="ko-KR" altLang="en-US"/>
           </a:p>
@@ -6437,7 +6437,7 @@
           <p:nvPr>
             <p:extLst>
               <p:ext uri="{D42A27DB-BD31-4B8C-83A1-F6EECF244321}">
-                <p14:modId xmlns:p14="http://schemas.microsoft.com/office/powerpoint/2010/main" val="3705995519"/>
+                <p14:modId xmlns:p14="http://schemas.microsoft.com/office/powerpoint/2010/main" val="1970844288"/>
               </p:ext>
             </p:extLst>
           </p:nvPr>
@@ -6915,7 +6915,7 @@
                           <a:ea typeface="나눔스퀘어_ac" panose="020B0600000101010101" pitchFamily="50" charset="-127"/>
                           <a:cs typeface="+mn-cs"/>
                         </a:rPr>
-                        <a:t>PK, FK</a:t>
+                        <a:t>PK</a:t>
                       </a:r>
                       <a:endParaRPr lang="ko-KR" altLang="en-US" sz="900" kern="1200" dirty="0">
                         <a:solidFill>
@@ -7068,7 +7068,7 @@
                     <a:p>
                       <a:pPr marL="0" algn="ctr" defTabSz="914400" rtl="0" eaLnBrk="1" latinLnBrk="1" hangingPunct="1"/>
                       <a:r>
-                        <a:rPr lang="en-US" altLang="ko-KR" sz="900" u="sng" kern="1200" dirty="0">
+                        <a:rPr lang="en-US" altLang="ko-KR" sz="900" u="none" kern="1200" dirty="0">
                           <a:solidFill>
                             <a:schemeClr val="tx1"/>
                           </a:solidFill>
@@ -7077,6 +7077,709 @@
                           <a:cs typeface="+mn-cs"/>
                         </a:rPr>
                         <a:t>FIXED_DATE</a:t>
+                      </a:r>
+                    </a:p>
+                  </a:txBody>
+                  <a:tcPr anchor="ctr">
+                    <a:lnL w="12700" cap="flat" cmpd="sng" algn="ctr">
+                      <a:solidFill>
+                        <a:schemeClr val="tx1"/>
+                      </a:solidFill>
+                      <a:prstDash val="solid"/>
+                      <a:round/>
+                      <a:headEnd type="none" w="med" len="med"/>
+                      <a:tailEnd type="none" w="med" len="med"/>
+                    </a:lnL>
+                    <a:lnR w="12700" cap="flat" cmpd="sng" algn="ctr">
+                      <a:solidFill>
+                        <a:schemeClr val="tx1"/>
+                      </a:solidFill>
+                      <a:prstDash val="solid"/>
+                      <a:round/>
+                      <a:headEnd type="none" w="med" len="med"/>
+                      <a:tailEnd type="none" w="med" len="med"/>
+                    </a:lnR>
+                    <a:lnT w="12700" cap="flat" cmpd="sng" algn="ctr">
+                      <a:solidFill>
+                        <a:schemeClr val="tx1"/>
+                      </a:solidFill>
+                      <a:prstDash val="solid"/>
+                      <a:round/>
+                      <a:headEnd type="none" w="med" len="med"/>
+                      <a:tailEnd type="none" w="med" len="med"/>
+                    </a:lnT>
+                    <a:lnB w="12700" cap="flat" cmpd="sng" algn="ctr">
+                      <a:solidFill>
+                        <a:schemeClr val="tx1"/>
+                      </a:solidFill>
+                      <a:prstDash val="solid"/>
+                      <a:round/>
+                      <a:headEnd type="none" w="med" len="med"/>
+                      <a:tailEnd type="none" w="med" len="med"/>
+                    </a:lnB>
+                    <a:solidFill>
+                      <a:schemeClr val="bg1"/>
+                    </a:solidFill>
+                  </a:tcPr>
+                </a:tc>
+                <a:tc>
+                  <a:txBody>
+                    <a:bodyPr/>
+                    <a:lstStyle/>
+                    <a:p>
+                      <a:pPr marL="0" marR="0" lvl="0" indent="0" algn="ctr" defTabSz="685800" rtl="0" eaLnBrk="1" fontAlgn="auto" latinLnBrk="1" hangingPunct="1">
+                        <a:lnSpc>
+                          <a:spcPct val="100000"/>
+                        </a:lnSpc>
+                        <a:spcBef>
+                          <a:spcPts val="0"/>
+                        </a:spcBef>
+                        <a:spcAft>
+                          <a:spcPts val="0"/>
+                        </a:spcAft>
+                        <a:buClrTx/>
+                        <a:buSzTx/>
+                        <a:buFontTx/>
+                        <a:buNone/>
+                        <a:tabLst/>
+                        <a:defRPr/>
+                      </a:pPr>
+                      <a:r>
+                        <a:rPr lang="en-US" altLang="ko-KR" sz="900" kern="1200" dirty="0">
+                          <a:solidFill>
+                            <a:schemeClr val="tx1"/>
+                          </a:solidFill>
+                          <a:latin typeface="나눔스퀘어_ac" panose="020B0600000101010101" pitchFamily="50" charset="-127"/>
+                          <a:ea typeface="나눔스퀘어_ac" panose="020B0600000101010101" pitchFamily="50" charset="-127"/>
+                          <a:cs typeface="+mn-cs"/>
+                        </a:rPr>
+                        <a:t>FK</a:t>
+                      </a:r>
+                      <a:endParaRPr lang="ko-KR" altLang="en-US" sz="900" kern="1200" dirty="0">
+                        <a:solidFill>
+                          <a:schemeClr val="tx1"/>
+                        </a:solidFill>
+                        <a:latin typeface="나눔스퀘어_ac" panose="020B0600000101010101" pitchFamily="50" charset="-127"/>
+                        <a:ea typeface="나눔스퀘어_ac" panose="020B0600000101010101" pitchFamily="50" charset="-127"/>
+                        <a:cs typeface="+mn-cs"/>
+                      </a:endParaRPr>
+                    </a:p>
+                  </a:txBody>
+                  <a:tcPr anchor="ctr">
+                    <a:lnL w="12700" cap="flat" cmpd="sng" algn="ctr">
+                      <a:solidFill>
+                        <a:schemeClr val="tx1"/>
+                      </a:solidFill>
+                      <a:prstDash val="solid"/>
+                      <a:round/>
+                      <a:headEnd type="none" w="med" len="med"/>
+                      <a:tailEnd type="none" w="med" len="med"/>
+                    </a:lnL>
+                    <a:lnR w="12700" cap="flat" cmpd="sng" algn="ctr">
+                      <a:solidFill>
+                        <a:schemeClr val="tx1"/>
+                      </a:solidFill>
+                      <a:prstDash val="solid"/>
+                      <a:round/>
+                      <a:headEnd type="none" w="med" len="med"/>
+                      <a:tailEnd type="none" w="med" len="med"/>
+                    </a:lnR>
+                    <a:lnT w="12700" cap="flat" cmpd="sng" algn="ctr">
+                      <a:solidFill>
+                        <a:schemeClr val="tx1"/>
+                      </a:solidFill>
+                      <a:prstDash val="solid"/>
+                      <a:round/>
+                      <a:headEnd type="none" w="med" len="med"/>
+                      <a:tailEnd type="none" w="med" len="med"/>
+                    </a:lnT>
+                    <a:lnB w="12700" cap="flat" cmpd="sng" algn="ctr">
+                      <a:solidFill>
+                        <a:schemeClr val="tx1"/>
+                      </a:solidFill>
+                      <a:prstDash val="solid"/>
+                      <a:round/>
+                      <a:headEnd type="none" w="med" len="med"/>
+                      <a:tailEnd type="none" w="med" len="med"/>
+                    </a:lnB>
+                    <a:solidFill>
+                      <a:schemeClr val="bg1"/>
+                    </a:solidFill>
+                  </a:tcPr>
+                </a:tc>
+                <a:tc>
+                  <a:txBody>
+                    <a:bodyPr/>
+                    <a:lstStyle/>
+                    <a:p>
+                      <a:pPr marL="0" marR="0" lvl="0" indent="0" algn="ctr" defTabSz="685800" rtl="0" eaLnBrk="1" fontAlgn="auto" latinLnBrk="1" hangingPunct="1">
+                        <a:lnSpc>
+                          <a:spcPct val="100000"/>
+                        </a:lnSpc>
+                        <a:spcBef>
+                          <a:spcPts val="0"/>
+                        </a:spcBef>
+                        <a:spcAft>
+                          <a:spcPts val="0"/>
+                        </a:spcAft>
+                        <a:buClrTx/>
+                        <a:buSzTx/>
+                        <a:buFontTx/>
+                        <a:buNone/>
+                        <a:tabLst/>
+                        <a:defRPr/>
+                      </a:pPr>
+                      <a:r>
+                        <a:rPr lang="en-US" altLang="ko-KR" sz="900" kern="1200" dirty="0">
+                          <a:solidFill>
+                            <a:schemeClr val="tx1"/>
+                          </a:solidFill>
+                          <a:latin typeface="나눔스퀘어_ac" panose="020B0600000101010101" pitchFamily="50" charset="-127"/>
+                          <a:ea typeface="나눔스퀘어_ac" panose="020B0600000101010101" pitchFamily="50" charset="-127"/>
+                          <a:cs typeface="+mn-cs"/>
+                        </a:rPr>
+                        <a:t>NUMBER(6)</a:t>
+                      </a:r>
+                      <a:endParaRPr lang="ko-KR" altLang="en-US" sz="900" kern="1200" dirty="0">
+                        <a:solidFill>
+                          <a:schemeClr val="tx1"/>
+                        </a:solidFill>
+                        <a:latin typeface="나눔스퀘어_ac" panose="020B0600000101010101" pitchFamily="50" charset="-127"/>
+                        <a:ea typeface="나눔스퀘어_ac" panose="020B0600000101010101" pitchFamily="50" charset="-127"/>
+                        <a:cs typeface="+mn-cs"/>
+                      </a:endParaRPr>
+                    </a:p>
+                  </a:txBody>
+                  <a:tcPr anchor="ctr">
+                    <a:lnL w="12700" cap="flat" cmpd="sng" algn="ctr">
+                      <a:solidFill>
+                        <a:schemeClr val="tx1"/>
+                      </a:solidFill>
+                      <a:prstDash val="solid"/>
+                      <a:round/>
+                      <a:headEnd type="none" w="med" len="med"/>
+                      <a:tailEnd type="none" w="med" len="med"/>
+                    </a:lnL>
+                    <a:lnR w="12700" cap="flat" cmpd="sng" algn="ctr">
+                      <a:solidFill>
+                        <a:schemeClr val="tx1"/>
+                      </a:solidFill>
+                      <a:prstDash val="solid"/>
+                      <a:round/>
+                      <a:headEnd type="none" w="med" len="med"/>
+                      <a:tailEnd type="none" w="med" len="med"/>
+                    </a:lnR>
+                    <a:lnT w="12700" cap="flat" cmpd="sng" algn="ctr">
+                      <a:solidFill>
+                        <a:schemeClr val="tx1"/>
+                      </a:solidFill>
+                      <a:prstDash val="solid"/>
+                      <a:round/>
+                      <a:headEnd type="none" w="med" len="med"/>
+                      <a:tailEnd type="none" w="med" len="med"/>
+                    </a:lnT>
+                    <a:lnB w="12700" cap="flat" cmpd="sng" algn="ctr">
+                      <a:solidFill>
+                        <a:schemeClr val="tx1"/>
+                      </a:solidFill>
+                      <a:prstDash val="solid"/>
+                      <a:round/>
+                      <a:headEnd type="none" w="med" len="med"/>
+                      <a:tailEnd type="none" w="med" len="med"/>
+                    </a:lnB>
+                    <a:solidFill>
+                      <a:schemeClr val="bg1"/>
+                    </a:solidFill>
+                  </a:tcPr>
+                </a:tc>
+                <a:extLst>
+                  <a:ext uri="{0D108BD9-81ED-4DB2-BD59-A6C34878D82A}">
+                    <a16:rowId xmlns:a16="http://schemas.microsoft.com/office/drawing/2014/main" val="1119326414"/>
+                  </a:ext>
+                </a:extLst>
+              </a:tr>
+              <a:tr h="204124">
+                <a:tc>
+                  <a:txBody>
+                    <a:bodyPr/>
+                    <a:lstStyle/>
+                    <a:p>
+                      <a:pPr marL="0" algn="ctr" defTabSz="914400" rtl="0" eaLnBrk="1" latinLnBrk="1" hangingPunct="1"/>
+                      <a:r>
+                        <a:rPr lang="en-US" altLang="ko-KR" sz="900" kern="1200" dirty="0">
+                          <a:solidFill>
+                            <a:schemeClr val="tx1"/>
+                          </a:solidFill>
+                          <a:latin typeface="나눔스퀘어_ac" panose="020B0600000101010101" pitchFamily="50" charset="-127"/>
+                          <a:ea typeface="나눔스퀘어_ac" panose="020B0600000101010101" pitchFamily="50" charset="-127"/>
+                          <a:cs typeface="+mn-cs"/>
+                        </a:rPr>
+                        <a:t>HOTPLACE_NAME</a:t>
+                      </a:r>
+                    </a:p>
+                  </a:txBody>
+                  <a:tcPr anchor="ctr">
+                    <a:lnL w="12700" cap="flat" cmpd="sng" algn="ctr">
+                      <a:solidFill>
+                        <a:schemeClr val="tx1"/>
+                      </a:solidFill>
+                      <a:prstDash val="solid"/>
+                      <a:round/>
+                      <a:headEnd type="none" w="med" len="med"/>
+                      <a:tailEnd type="none" w="med" len="med"/>
+                    </a:lnL>
+                    <a:lnR w="12700" cap="flat" cmpd="sng" algn="ctr">
+                      <a:solidFill>
+                        <a:schemeClr val="tx1"/>
+                      </a:solidFill>
+                      <a:prstDash val="solid"/>
+                      <a:round/>
+                      <a:headEnd type="none" w="med" len="med"/>
+                      <a:tailEnd type="none" w="med" len="med"/>
+                    </a:lnR>
+                    <a:lnT w="12700" cap="flat" cmpd="sng" algn="ctr">
+                      <a:solidFill>
+                        <a:schemeClr val="tx1"/>
+                      </a:solidFill>
+                      <a:prstDash val="solid"/>
+                      <a:round/>
+                      <a:headEnd type="none" w="med" len="med"/>
+                      <a:tailEnd type="none" w="med" len="med"/>
+                    </a:lnT>
+                    <a:lnB w="12700" cap="flat" cmpd="sng" algn="ctr">
+                      <a:solidFill>
+                        <a:schemeClr val="tx1"/>
+                      </a:solidFill>
+                      <a:prstDash val="solid"/>
+                      <a:round/>
+                      <a:headEnd type="none" w="med" len="med"/>
+                      <a:tailEnd type="none" w="med" len="med"/>
+                    </a:lnB>
+                    <a:solidFill>
+                      <a:schemeClr val="bg1"/>
+                    </a:solidFill>
+                  </a:tcPr>
+                </a:tc>
+                <a:tc>
+                  <a:txBody>
+                    <a:bodyPr/>
+                    <a:lstStyle/>
+                    <a:p>
+                      <a:pPr marL="0" marR="0" lvl="0" indent="0" algn="ctr" defTabSz="685800" rtl="0" eaLnBrk="1" fontAlgn="auto" latinLnBrk="1" hangingPunct="1">
+                        <a:lnSpc>
+                          <a:spcPct val="100000"/>
+                        </a:lnSpc>
+                        <a:spcBef>
+                          <a:spcPts val="0"/>
+                        </a:spcBef>
+                        <a:spcAft>
+                          <a:spcPts val="0"/>
+                        </a:spcAft>
+                        <a:buClrTx/>
+                        <a:buSzTx/>
+                        <a:buFontTx/>
+                        <a:buNone/>
+                        <a:tabLst/>
+                        <a:defRPr/>
+                      </a:pPr>
+                      <a:r>
+                        <a:rPr lang="en-US" altLang="ko-KR" sz="900" kern="1200" dirty="0">
+                          <a:solidFill>
+                            <a:schemeClr val="tx1"/>
+                          </a:solidFill>
+                          <a:latin typeface="나눔스퀘어_ac" panose="020B0600000101010101" pitchFamily="50" charset="-127"/>
+                          <a:ea typeface="나눔스퀘어_ac" panose="020B0600000101010101" pitchFamily="50" charset="-127"/>
+                          <a:cs typeface="+mn-cs"/>
+                        </a:rPr>
+                        <a:t>FK</a:t>
+                      </a:r>
+                      <a:endParaRPr lang="ko-KR" altLang="en-US" sz="900" kern="1200" dirty="0">
+                        <a:solidFill>
+                          <a:schemeClr val="tx1"/>
+                        </a:solidFill>
+                        <a:latin typeface="나눔스퀘어_ac" panose="020B0600000101010101" pitchFamily="50" charset="-127"/>
+                        <a:ea typeface="나눔스퀘어_ac" panose="020B0600000101010101" pitchFamily="50" charset="-127"/>
+                        <a:cs typeface="+mn-cs"/>
+                      </a:endParaRPr>
+                    </a:p>
+                  </a:txBody>
+                  <a:tcPr anchor="ctr">
+                    <a:lnL w="12700" cap="flat" cmpd="sng" algn="ctr">
+                      <a:solidFill>
+                        <a:schemeClr val="tx1"/>
+                      </a:solidFill>
+                      <a:prstDash val="solid"/>
+                      <a:round/>
+                      <a:headEnd type="none" w="med" len="med"/>
+                      <a:tailEnd type="none" w="med" len="med"/>
+                    </a:lnL>
+                    <a:lnR w="12700" cap="flat" cmpd="sng" algn="ctr">
+                      <a:solidFill>
+                        <a:schemeClr val="tx1"/>
+                      </a:solidFill>
+                      <a:prstDash val="solid"/>
+                      <a:round/>
+                      <a:headEnd type="none" w="med" len="med"/>
+                      <a:tailEnd type="none" w="med" len="med"/>
+                    </a:lnR>
+                    <a:lnT w="12700" cap="flat" cmpd="sng" algn="ctr">
+                      <a:solidFill>
+                        <a:schemeClr val="tx1"/>
+                      </a:solidFill>
+                      <a:prstDash val="solid"/>
+                      <a:round/>
+                      <a:headEnd type="none" w="med" len="med"/>
+                      <a:tailEnd type="none" w="med" len="med"/>
+                    </a:lnT>
+                    <a:lnB w="12700" cap="flat" cmpd="sng" algn="ctr">
+                      <a:solidFill>
+                        <a:schemeClr val="tx1"/>
+                      </a:solidFill>
+                      <a:prstDash val="solid"/>
+                      <a:round/>
+                      <a:headEnd type="none" w="med" len="med"/>
+                      <a:tailEnd type="none" w="med" len="med"/>
+                    </a:lnB>
+                    <a:solidFill>
+                      <a:schemeClr val="bg1"/>
+                    </a:solidFill>
+                  </a:tcPr>
+                </a:tc>
+                <a:tc>
+                  <a:txBody>
+                    <a:bodyPr/>
+                    <a:lstStyle/>
+                    <a:p>
+                      <a:pPr marL="0" marR="0" lvl="0" indent="0" algn="ctr" defTabSz="685800" rtl="0" eaLnBrk="1" fontAlgn="auto" latinLnBrk="1" hangingPunct="1">
+                        <a:lnSpc>
+                          <a:spcPct val="100000"/>
+                        </a:lnSpc>
+                        <a:spcBef>
+                          <a:spcPts val="0"/>
+                        </a:spcBef>
+                        <a:spcAft>
+                          <a:spcPts val="0"/>
+                        </a:spcAft>
+                        <a:buClrTx/>
+                        <a:buSzTx/>
+                        <a:buFontTx/>
+                        <a:buNone/>
+                        <a:tabLst/>
+                        <a:defRPr/>
+                      </a:pPr>
+                      <a:r>
+                        <a:rPr lang="en-US" altLang="ko-KR" sz="900" kern="1200" dirty="0">
+                          <a:solidFill>
+                            <a:schemeClr val="tx1"/>
+                          </a:solidFill>
+                          <a:latin typeface="나눔스퀘어_ac" panose="020B0600000101010101" pitchFamily="50" charset="-127"/>
+                          <a:ea typeface="나눔스퀘어_ac" panose="020B0600000101010101" pitchFamily="50" charset="-127"/>
+                          <a:cs typeface="+mn-cs"/>
+                        </a:rPr>
+                        <a:t>VARCHAR2(30)</a:t>
+                      </a:r>
+                      <a:endParaRPr lang="ko-KR" altLang="en-US" sz="900" kern="1200" dirty="0">
+                        <a:solidFill>
+                          <a:schemeClr val="tx1"/>
+                        </a:solidFill>
+                        <a:latin typeface="나눔스퀘어_ac" panose="020B0600000101010101" pitchFamily="50" charset="-127"/>
+                        <a:ea typeface="나눔스퀘어_ac" panose="020B0600000101010101" pitchFamily="50" charset="-127"/>
+                        <a:cs typeface="+mn-cs"/>
+                      </a:endParaRPr>
+                    </a:p>
+                  </a:txBody>
+                  <a:tcPr anchor="ctr">
+                    <a:lnL w="12700" cap="flat" cmpd="sng" algn="ctr">
+                      <a:solidFill>
+                        <a:schemeClr val="tx1"/>
+                      </a:solidFill>
+                      <a:prstDash val="solid"/>
+                      <a:round/>
+                      <a:headEnd type="none" w="med" len="med"/>
+                      <a:tailEnd type="none" w="med" len="med"/>
+                    </a:lnL>
+                    <a:lnR w="12700" cap="flat" cmpd="sng" algn="ctr">
+                      <a:solidFill>
+                        <a:schemeClr val="tx1"/>
+                      </a:solidFill>
+                      <a:prstDash val="solid"/>
+                      <a:round/>
+                      <a:headEnd type="none" w="med" len="med"/>
+                      <a:tailEnd type="none" w="med" len="med"/>
+                    </a:lnR>
+                    <a:lnT w="12700" cap="flat" cmpd="sng" algn="ctr">
+                      <a:solidFill>
+                        <a:schemeClr val="tx1"/>
+                      </a:solidFill>
+                      <a:prstDash val="solid"/>
+                      <a:round/>
+                      <a:headEnd type="none" w="med" len="med"/>
+                      <a:tailEnd type="none" w="med" len="med"/>
+                    </a:lnT>
+                    <a:lnB w="12700" cap="flat" cmpd="sng" algn="ctr">
+                      <a:solidFill>
+                        <a:schemeClr val="tx1"/>
+                      </a:solidFill>
+                      <a:prstDash val="solid"/>
+                      <a:round/>
+                      <a:headEnd type="none" w="med" len="med"/>
+                      <a:tailEnd type="none" w="med" len="med"/>
+                    </a:lnB>
+                    <a:solidFill>
+                      <a:schemeClr val="bg1"/>
+                    </a:solidFill>
+                  </a:tcPr>
+                </a:tc>
+                <a:extLst>
+                  <a:ext uri="{0D108BD9-81ED-4DB2-BD59-A6C34878D82A}">
+                    <a16:rowId xmlns:a16="http://schemas.microsoft.com/office/drawing/2014/main" val="69797215"/>
+                  </a:ext>
+                </a:extLst>
+              </a:tr>
+              <a:tr h="204124">
+                <a:tc>
+                  <a:txBody>
+                    <a:bodyPr/>
+                    <a:lstStyle/>
+                    <a:p>
+                      <a:pPr marL="0" algn="ctr" defTabSz="914400" rtl="0" eaLnBrk="1" latinLnBrk="1" hangingPunct="1"/>
+                      <a:r>
+                        <a:rPr lang="en-US" altLang="ko-KR" sz="900" kern="1200" dirty="0">
+                          <a:solidFill>
+                            <a:schemeClr val="tx1"/>
+                          </a:solidFill>
+                          <a:latin typeface="나눔스퀘어_ac" panose="020B0600000101010101" pitchFamily="50" charset="-127"/>
+                          <a:ea typeface="나눔스퀘어_ac" panose="020B0600000101010101" pitchFamily="50" charset="-127"/>
+                          <a:cs typeface="+mn-cs"/>
+                        </a:rPr>
+                        <a:t>PLAN_NAME</a:t>
+                      </a:r>
+                    </a:p>
+                  </a:txBody>
+                  <a:tcPr anchor="ctr">
+                    <a:lnL w="12700" cap="flat" cmpd="sng" algn="ctr">
+                      <a:solidFill>
+                        <a:schemeClr val="tx1"/>
+                      </a:solidFill>
+                      <a:prstDash val="solid"/>
+                      <a:round/>
+                      <a:headEnd type="none" w="med" len="med"/>
+                      <a:tailEnd type="none" w="med" len="med"/>
+                    </a:lnL>
+                    <a:lnR w="12700" cap="flat" cmpd="sng" algn="ctr">
+                      <a:solidFill>
+                        <a:schemeClr val="tx1"/>
+                      </a:solidFill>
+                      <a:prstDash val="solid"/>
+                      <a:round/>
+                      <a:headEnd type="none" w="med" len="med"/>
+                      <a:tailEnd type="none" w="med" len="med"/>
+                    </a:lnR>
+                    <a:lnT w="12700" cap="flat" cmpd="sng" algn="ctr">
+                      <a:solidFill>
+                        <a:schemeClr val="tx1"/>
+                      </a:solidFill>
+                      <a:prstDash val="solid"/>
+                      <a:round/>
+                      <a:headEnd type="none" w="med" len="med"/>
+                      <a:tailEnd type="none" w="med" len="med"/>
+                    </a:lnT>
+                    <a:lnB w="12700" cap="flat" cmpd="sng" algn="ctr">
+                      <a:solidFill>
+                        <a:schemeClr val="tx1"/>
+                      </a:solidFill>
+                      <a:prstDash val="solid"/>
+                      <a:round/>
+                      <a:headEnd type="none" w="med" len="med"/>
+                      <a:tailEnd type="none" w="med" len="med"/>
+                    </a:lnB>
+                    <a:solidFill>
+                      <a:schemeClr val="bg1"/>
+                    </a:solidFill>
+                  </a:tcPr>
+                </a:tc>
+                <a:tc>
+                  <a:txBody>
+                    <a:bodyPr/>
+                    <a:lstStyle/>
+                    <a:p>
+                      <a:pPr marL="0" marR="0" lvl="0" indent="0" algn="ctr" defTabSz="685800" rtl="0" eaLnBrk="1" fontAlgn="auto" latinLnBrk="1" hangingPunct="1">
+                        <a:lnSpc>
+                          <a:spcPct val="100000"/>
+                        </a:lnSpc>
+                        <a:spcBef>
+                          <a:spcPts val="0"/>
+                        </a:spcBef>
+                        <a:spcAft>
+                          <a:spcPts val="0"/>
+                        </a:spcAft>
+                        <a:buClrTx/>
+                        <a:buSzTx/>
+                        <a:buFontTx/>
+                        <a:buNone/>
+                        <a:tabLst/>
+                        <a:defRPr/>
+                      </a:pPr>
+                      <a:endParaRPr lang="ko-KR" altLang="en-US" sz="900" kern="1200" dirty="0">
+                        <a:solidFill>
+                          <a:schemeClr val="tx1"/>
+                        </a:solidFill>
+                        <a:latin typeface="나눔스퀘어_ac" panose="020B0600000101010101" pitchFamily="50" charset="-127"/>
+                        <a:ea typeface="나눔스퀘어_ac" panose="020B0600000101010101" pitchFamily="50" charset="-127"/>
+                        <a:cs typeface="+mn-cs"/>
+                      </a:endParaRPr>
+                    </a:p>
+                  </a:txBody>
+                  <a:tcPr anchor="ctr">
+                    <a:lnL w="12700" cap="flat" cmpd="sng" algn="ctr">
+                      <a:solidFill>
+                        <a:schemeClr val="tx1"/>
+                      </a:solidFill>
+                      <a:prstDash val="solid"/>
+                      <a:round/>
+                      <a:headEnd type="none" w="med" len="med"/>
+                      <a:tailEnd type="none" w="med" len="med"/>
+                    </a:lnL>
+                    <a:lnR w="12700" cap="flat" cmpd="sng" algn="ctr">
+                      <a:solidFill>
+                        <a:schemeClr val="tx1"/>
+                      </a:solidFill>
+                      <a:prstDash val="solid"/>
+                      <a:round/>
+                      <a:headEnd type="none" w="med" len="med"/>
+                      <a:tailEnd type="none" w="med" len="med"/>
+                    </a:lnR>
+                    <a:lnT w="12700" cap="flat" cmpd="sng" algn="ctr">
+                      <a:solidFill>
+                        <a:schemeClr val="tx1"/>
+                      </a:solidFill>
+                      <a:prstDash val="solid"/>
+                      <a:round/>
+                      <a:headEnd type="none" w="med" len="med"/>
+                      <a:tailEnd type="none" w="med" len="med"/>
+                    </a:lnT>
+                    <a:lnB w="12700" cap="flat" cmpd="sng" algn="ctr">
+                      <a:solidFill>
+                        <a:schemeClr val="tx1"/>
+                      </a:solidFill>
+                      <a:prstDash val="solid"/>
+                      <a:round/>
+                      <a:headEnd type="none" w="med" len="med"/>
+                      <a:tailEnd type="none" w="med" len="med"/>
+                    </a:lnB>
+                    <a:solidFill>
+                      <a:schemeClr val="bg1"/>
+                    </a:solidFill>
+                  </a:tcPr>
+                </a:tc>
+                <a:tc>
+                  <a:txBody>
+                    <a:bodyPr/>
+                    <a:lstStyle/>
+                    <a:p>
+                      <a:pPr marL="0" marR="0" lvl="0" indent="0" algn="ctr" defTabSz="685800" rtl="0" eaLnBrk="1" fontAlgn="auto" latinLnBrk="1" hangingPunct="1">
+                        <a:lnSpc>
+                          <a:spcPct val="100000"/>
+                        </a:lnSpc>
+                        <a:spcBef>
+                          <a:spcPts val="0"/>
+                        </a:spcBef>
+                        <a:spcAft>
+                          <a:spcPts val="0"/>
+                        </a:spcAft>
+                        <a:buClrTx/>
+                        <a:buSzTx/>
+                        <a:buFontTx/>
+                        <a:buNone/>
+                        <a:tabLst/>
+                        <a:defRPr/>
+                      </a:pPr>
+                      <a:r>
+                        <a:rPr lang="en-US" altLang="ko-KR" sz="900" kern="1200" dirty="0">
+                          <a:solidFill>
+                            <a:schemeClr val="tx1"/>
+                          </a:solidFill>
+                          <a:latin typeface="나눔스퀘어_ac" panose="020B0600000101010101" pitchFamily="50" charset="-127"/>
+                          <a:ea typeface="나눔스퀘어_ac" panose="020B0600000101010101" pitchFamily="50" charset="-127"/>
+                          <a:cs typeface="+mn-cs"/>
+                        </a:rPr>
+                        <a:t>VARCHAR2(30)</a:t>
+                      </a:r>
+                      <a:endParaRPr lang="ko-KR" altLang="en-US" sz="900" kern="1200" dirty="0">
+                        <a:solidFill>
+                          <a:schemeClr val="tx1"/>
+                        </a:solidFill>
+                        <a:latin typeface="나눔스퀘어_ac" panose="020B0600000101010101" pitchFamily="50" charset="-127"/>
+                        <a:ea typeface="나눔스퀘어_ac" panose="020B0600000101010101" pitchFamily="50" charset="-127"/>
+                        <a:cs typeface="+mn-cs"/>
+                      </a:endParaRPr>
+                    </a:p>
+                  </a:txBody>
+                  <a:tcPr anchor="ctr">
+                    <a:lnL w="12700" cap="flat" cmpd="sng" algn="ctr">
+                      <a:solidFill>
+                        <a:schemeClr val="tx1"/>
+                      </a:solidFill>
+                      <a:prstDash val="solid"/>
+                      <a:round/>
+                      <a:headEnd type="none" w="med" len="med"/>
+                      <a:tailEnd type="none" w="med" len="med"/>
+                    </a:lnL>
+                    <a:lnR w="12700" cap="flat" cmpd="sng" algn="ctr">
+                      <a:solidFill>
+                        <a:schemeClr val="tx1"/>
+                      </a:solidFill>
+                      <a:prstDash val="solid"/>
+                      <a:round/>
+                      <a:headEnd type="none" w="med" len="med"/>
+                      <a:tailEnd type="none" w="med" len="med"/>
+                    </a:lnR>
+                    <a:lnT w="12700" cap="flat" cmpd="sng" algn="ctr">
+                      <a:solidFill>
+                        <a:schemeClr val="tx1"/>
+                      </a:solidFill>
+                      <a:prstDash val="solid"/>
+                      <a:round/>
+                      <a:headEnd type="none" w="med" len="med"/>
+                      <a:tailEnd type="none" w="med" len="med"/>
+                    </a:lnT>
+                    <a:lnB w="12700" cap="flat" cmpd="sng" algn="ctr">
+                      <a:solidFill>
+                        <a:schemeClr val="tx1"/>
+                      </a:solidFill>
+                      <a:prstDash val="solid"/>
+                      <a:round/>
+                      <a:headEnd type="none" w="med" len="med"/>
+                      <a:tailEnd type="none" w="med" len="med"/>
+                    </a:lnB>
+                    <a:solidFill>
+                      <a:schemeClr val="bg1"/>
+                    </a:solidFill>
+                  </a:tcPr>
+                </a:tc>
+                <a:extLst>
+                  <a:ext uri="{0D108BD9-81ED-4DB2-BD59-A6C34878D82A}">
+                    <a16:rowId xmlns:a16="http://schemas.microsoft.com/office/drawing/2014/main" val="826941391"/>
+                  </a:ext>
+                </a:extLst>
+              </a:tr>
+              <a:tr h="204124">
+                <a:tc>
+                  <a:txBody>
+                    <a:bodyPr/>
+                    <a:lstStyle/>
+                    <a:p>
+                      <a:pPr marL="0" algn="ctr" defTabSz="914400" rtl="0" eaLnBrk="1" latinLnBrk="1" hangingPunct="1"/>
+                      <a:r>
+                        <a:rPr lang="en-US" altLang="ko-KR" sz="900" kern="1200" dirty="0">
+                          <a:solidFill>
+                            <a:schemeClr val="tx1"/>
+                          </a:solidFill>
+                          <a:latin typeface="나눔스퀘어_ac" panose="020B0600000101010101" pitchFamily="50" charset="-127"/>
+                          <a:ea typeface="나눔스퀘어_ac" panose="020B0600000101010101" pitchFamily="50" charset="-127"/>
+                          <a:cs typeface="+mn-cs"/>
+                        </a:rPr>
+                        <a:t>HOST_ID</a:t>
                       </a:r>
                     </a:p>
                   </a:txBody>
@@ -7238,709 +7941,6 @@
                           <a:ea typeface="나눔스퀘어_ac" panose="020B0600000101010101" pitchFamily="50" charset="-127"/>
                           <a:cs typeface="+mn-cs"/>
                         </a:rPr>
-                        <a:t>NUMBER(6)</a:t>
-                      </a:r>
-                      <a:endParaRPr lang="ko-KR" altLang="en-US" sz="900" kern="1200" dirty="0">
-                        <a:solidFill>
-                          <a:schemeClr val="tx1"/>
-                        </a:solidFill>
-                        <a:latin typeface="나눔스퀘어_ac" panose="020B0600000101010101" pitchFamily="50" charset="-127"/>
-                        <a:ea typeface="나눔스퀘어_ac" panose="020B0600000101010101" pitchFamily="50" charset="-127"/>
-                        <a:cs typeface="+mn-cs"/>
-                      </a:endParaRPr>
-                    </a:p>
-                  </a:txBody>
-                  <a:tcPr anchor="ctr">
-                    <a:lnL w="12700" cap="flat" cmpd="sng" algn="ctr">
-                      <a:solidFill>
-                        <a:schemeClr val="tx1"/>
-                      </a:solidFill>
-                      <a:prstDash val="solid"/>
-                      <a:round/>
-                      <a:headEnd type="none" w="med" len="med"/>
-                      <a:tailEnd type="none" w="med" len="med"/>
-                    </a:lnL>
-                    <a:lnR w="12700" cap="flat" cmpd="sng" algn="ctr">
-                      <a:solidFill>
-                        <a:schemeClr val="tx1"/>
-                      </a:solidFill>
-                      <a:prstDash val="solid"/>
-                      <a:round/>
-                      <a:headEnd type="none" w="med" len="med"/>
-                      <a:tailEnd type="none" w="med" len="med"/>
-                    </a:lnR>
-                    <a:lnT w="12700" cap="flat" cmpd="sng" algn="ctr">
-                      <a:solidFill>
-                        <a:schemeClr val="tx1"/>
-                      </a:solidFill>
-                      <a:prstDash val="solid"/>
-                      <a:round/>
-                      <a:headEnd type="none" w="med" len="med"/>
-                      <a:tailEnd type="none" w="med" len="med"/>
-                    </a:lnT>
-                    <a:lnB w="12700" cap="flat" cmpd="sng" algn="ctr">
-                      <a:solidFill>
-                        <a:schemeClr val="tx1"/>
-                      </a:solidFill>
-                      <a:prstDash val="solid"/>
-                      <a:round/>
-                      <a:headEnd type="none" w="med" len="med"/>
-                      <a:tailEnd type="none" w="med" len="med"/>
-                    </a:lnB>
-                    <a:solidFill>
-                      <a:schemeClr val="bg1"/>
-                    </a:solidFill>
-                  </a:tcPr>
-                </a:tc>
-                <a:extLst>
-                  <a:ext uri="{0D108BD9-81ED-4DB2-BD59-A6C34878D82A}">
-                    <a16:rowId xmlns:a16="http://schemas.microsoft.com/office/drawing/2014/main" val="1119326414"/>
-                  </a:ext>
-                </a:extLst>
-              </a:tr>
-              <a:tr h="204124">
-                <a:tc>
-                  <a:txBody>
-                    <a:bodyPr/>
-                    <a:lstStyle/>
-                    <a:p>
-                      <a:pPr marL="0" algn="ctr" defTabSz="914400" rtl="0" eaLnBrk="1" latinLnBrk="1" hangingPunct="1"/>
-                      <a:r>
-                        <a:rPr lang="en-US" altLang="ko-KR" sz="900" kern="1200" dirty="0">
-                          <a:solidFill>
-                            <a:schemeClr val="tx1"/>
-                          </a:solidFill>
-                          <a:latin typeface="나눔스퀘어_ac" panose="020B0600000101010101" pitchFamily="50" charset="-127"/>
-                          <a:ea typeface="나눔스퀘어_ac" panose="020B0600000101010101" pitchFamily="50" charset="-127"/>
-                          <a:cs typeface="+mn-cs"/>
-                        </a:rPr>
-                        <a:t>HOTPLACE_NAME</a:t>
-                      </a:r>
-                    </a:p>
-                  </a:txBody>
-                  <a:tcPr anchor="ctr">
-                    <a:lnL w="12700" cap="flat" cmpd="sng" algn="ctr">
-                      <a:solidFill>
-                        <a:schemeClr val="tx1"/>
-                      </a:solidFill>
-                      <a:prstDash val="solid"/>
-                      <a:round/>
-                      <a:headEnd type="none" w="med" len="med"/>
-                      <a:tailEnd type="none" w="med" len="med"/>
-                    </a:lnL>
-                    <a:lnR w="12700" cap="flat" cmpd="sng" algn="ctr">
-                      <a:solidFill>
-                        <a:schemeClr val="tx1"/>
-                      </a:solidFill>
-                      <a:prstDash val="solid"/>
-                      <a:round/>
-                      <a:headEnd type="none" w="med" len="med"/>
-                      <a:tailEnd type="none" w="med" len="med"/>
-                    </a:lnR>
-                    <a:lnT w="12700" cap="flat" cmpd="sng" algn="ctr">
-                      <a:solidFill>
-                        <a:schemeClr val="tx1"/>
-                      </a:solidFill>
-                      <a:prstDash val="solid"/>
-                      <a:round/>
-                      <a:headEnd type="none" w="med" len="med"/>
-                      <a:tailEnd type="none" w="med" len="med"/>
-                    </a:lnT>
-                    <a:lnB w="12700" cap="flat" cmpd="sng" algn="ctr">
-                      <a:solidFill>
-                        <a:schemeClr val="tx1"/>
-                      </a:solidFill>
-                      <a:prstDash val="solid"/>
-                      <a:round/>
-                      <a:headEnd type="none" w="med" len="med"/>
-                      <a:tailEnd type="none" w="med" len="med"/>
-                    </a:lnB>
-                    <a:solidFill>
-                      <a:schemeClr val="bg1"/>
-                    </a:solidFill>
-                  </a:tcPr>
-                </a:tc>
-                <a:tc>
-                  <a:txBody>
-                    <a:bodyPr/>
-                    <a:lstStyle/>
-                    <a:p>
-                      <a:pPr marL="0" marR="0" lvl="0" indent="0" algn="ctr" defTabSz="685800" rtl="0" eaLnBrk="1" fontAlgn="auto" latinLnBrk="1" hangingPunct="1">
-                        <a:lnSpc>
-                          <a:spcPct val="100000"/>
-                        </a:lnSpc>
-                        <a:spcBef>
-                          <a:spcPts val="0"/>
-                        </a:spcBef>
-                        <a:spcAft>
-                          <a:spcPts val="0"/>
-                        </a:spcAft>
-                        <a:buClrTx/>
-                        <a:buSzTx/>
-                        <a:buFontTx/>
-                        <a:buNone/>
-                        <a:tabLst/>
-                        <a:defRPr/>
-                      </a:pPr>
-                      <a:r>
-                        <a:rPr lang="en-US" altLang="ko-KR" sz="900" kern="1200" dirty="0">
-                          <a:solidFill>
-                            <a:schemeClr val="tx1"/>
-                          </a:solidFill>
-                          <a:latin typeface="나눔스퀘어_ac" panose="020B0600000101010101" pitchFamily="50" charset="-127"/>
-                          <a:ea typeface="나눔스퀘어_ac" panose="020B0600000101010101" pitchFamily="50" charset="-127"/>
-                          <a:cs typeface="+mn-cs"/>
-                        </a:rPr>
-                        <a:t>FK, NOT NULL</a:t>
-                      </a:r>
-                      <a:endParaRPr lang="ko-KR" altLang="en-US" sz="900" kern="1200" dirty="0">
-                        <a:solidFill>
-                          <a:schemeClr val="tx1"/>
-                        </a:solidFill>
-                        <a:latin typeface="나눔스퀘어_ac" panose="020B0600000101010101" pitchFamily="50" charset="-127"/>
-                        <a:ea typeface="나눔스퀘어_ac" panose="020B0600000101010101" pitchFamily="50" charset="-127"/>
-                        <a:cs typeface="+mn-cs"/>
-                      </a:endParaRPr>
-                    </a:p>
-                  </a:txBody>
-                  <a:tcPr anchor="ctr">
-                    <a:lnL w="12700" cap="flat" cmpd="sng" algn="ctr">
-                      <a:solidFill>
-                        <a:schemeClr val="tx1"/>
-                      </a:solidFill>
-                      <a:prstDash val="solid"/>
-                      <a:round/>
-                      <a:headEnd type="none" w="med" len="med"/>
-                      <a:tailEnd type="none" w="med" len="med"/>
-                    </a:lnL>
-                    <a:lnR w="12700" cap="flat" cmpd="sng" algn="ctr">
-                      <a:solidFill>
-                        <a:schemeClr val="tx1"/>
-                      </a:solidFill>
-                      <a:prstDash val="solid"/>
-                      <a:round/>
-                      <a:headEnd type="none" w="med" len="med"/>
-                      <a:tailEnd type="none" w="med" len="med"/>
-                    </a:lnR>
-                    <a:lnT w="12700" cap="flat" cmpd="sng" algn="ctr">
-                      <a:solidFill>
-                        <a:schemeClr val="tx1"/>
-                      </a:solidFill>
-                      <a:prstDash val="solid"/>
-                      <a:round/>
-                      <a:headEnd type="none" w="med" len="med"/>
-                      <a:tailEnd type="none" w="med" len="med"/>
-                    </a:lnT>
-                    <a:lnB w="12700" cap="flat" cmpd="sng" algn="ctr">
-                      <a:solidFill>
-                        <a:schemeClr val="tx1"/>
-                      </a:solidFill>
-                      <a:prstDash val="solid"/>
-                      <a:round/>
-                      <a:headEnd type="none" w="med" len="med"/>
-                      <a:tailEnd type="none" w="med" len="med"/>
-                    </a:lnB>
-                    <a:solidFill>
-                      <a:schemeClr val="bg1"/>
-                    </a:solidFill>
-                  </a:tcPr>
-                </a:tc>
-                <a:tc>
-                  <a:txBody>
-                    <a:bodyPr/>
-                    <a:lstStyle/>
-                    <a:p>
-                      <a:pPr marL="0" marR="0" lvl="0" indent="0" algn="ctr" defTabSz="685800" rtl="0" eaLnBrk="1" fontAlgn="auto" latinLnBrk="1" hangingPunct="1">
-                        <a:lnSpc>
-                          <a:spcPct val="100000"/>
-                        </a:lnSpc>
-                        <a:spcBef>
-                          <a:spcPts val="0"/>
-                        </a:spcBef>
-                        <a:spcAft>
-                          <a:spcPts val="0"/>
-                        </a:spcAft>
-                        <a:buClrTx/>
-                        <a:buSzTx/>
-                        <a:buFontTx/>
-                        <a:buNone/>
-                        <a:tabLst/>
-                        <a:defRPr/>
-                      </a:pPr>
-                      <a:r>
-                        <a:rPr lang="en-US" altLang="ko-KR" sz="900" kern="1200" dirty="0">
-                          <a:solidFill>
-                            <a:schemeClr val="tx1"/>
-                          </a:solidFill>
-                          <a:latin typeface="나눔스퀘어_ac" panose="020B0600000101010101" pitchFamily="50" charset="-127"/>
-                          <a:ea typeface="나눔스퀘어_ac" panose="020B0600000101010101" pitchFamily="50" charset="-127"/>
-                          <a:cs typeface="+mn-cs"/>
-                        </a:rPr>
-                        <a:t>VARCHAR2(30)</a:t>
-                      </a:r>
-                      <a:endParaRPr lang="ko-KR" altLang="en-US" sz="900" kern="1200" dirty="0">
-                        <a:solidFill>
-                          <a:schemeClr val="tx1"/>
-                        </a:solidFill>
-                        <a:latin typeface="나눔스퀘어_ac" panose="020B0600000101010101" pitchFamily="50" charset="-127"/>
-                        <a:ea typeface="나눔스퀘어_ac" panose="020B0600000101010101" pitchFamily="50" charset="-127"/>
-                        <a:cs typeface="+mn-cs"/>
-                      </a:endParaRPr>
-                    </a:p>
-                  </a:txBody>
-                  <a:tcPr anchor="ctr">
-                    <a:lnL w="12700" cap="flat" cmpd="sng" algn="ctr">
-                      <a:solidFill>
-                        <a:schemeClr val="tx1"/>
-                      </a:solidFill>
-                      <a:prstDash val="solid"/>
-                      <a:round/>
-                      <a:headEnd type="none" w="med" len="med"/>
-                      <a:tailEnd type="none" w="med" len="med"/>
-                    </a:lnL>
-                    <a:lnR w="12700" cap="flat" cmpd="sng" algn="ctr">
-                      <a:solidFill>
-                        <a:schemeClr val="tx1"/>
-                      </a:solidFill>
-                      <a:prstDash val="solid"/>
-                      <a:round/>
-                      <a:headEnd type="none" w="med" len="med"/>
-                      <a:tailEnd type="none" w="med" len="med"/>
-                    </a:lnR>
-                    <a:lnT w="12700" cap="flat" cmpd="sng" algn="ctr">
-                      <a:solidFill>
-                        <a:schemeClr val="tx1"/>
-                      </a:solidFill>
-                      <a:prstDash val="solid"/>
-                      <a:round/>
-                      <a:headEnd type="none" w="med" len="med"/>
-                      <a:tailEnd type="none" w="med" len="med"/>
-                    </a:lnT>
-                    <a:lnB w="12700" cap="flat" cmpd="sng" algn="ctr">
-                      <a:solidFill>
-                        <a:schemeClr val="tx1"/>
-                      </a:solidFill>
-                      <a:prstDash val="solid"/>
-                      <a:round/>
-                      <a:headEnd type="none" w="med" len="med"/>
-                      <a:tailEnd type="none" w="med" len="med"/>
-                    </a:lnB>
-                    <a:solidFill>
-                      <a:schemeClr val="bg1"/>
-                    </a:solidFill>
-                  </a:tcPr>
-                </a:tc>
-                <a:extLst>
-                  <a:ext uri="{0D108BD9-81ED-4DB2-BD59-A6C34878D82A}">
-                    <a16:rowId xmlns:a16="http://schemas.microsoft.com/office/drawing/2014/main" val="69797215"/>
-                  </a:ext>
-                </a:extLst>
-              </a:tr>
-              <a:tr h="204124">
-                <a:tc>
-                  <a:txBody>
-                    <a:bodyPr/>
-                    <a:lstStyle/>
-                    <a:p>
-                      <a:pPr marL="0" algn="ctr" defTabSz="914400" rtl="0" eaLnBrk="1" latinLnBrk="1" hangingPunct="1"/>
-                      <a:r>
-                        <a:rPr lang="en-US" altLang="ko-KR" sz="900" kern="1200" dirty="0">
-                          <a:solidFill>
-                            <a:schemeClr val="tx1"/>
-                          </a:solidFill>
-                          <a:latin typeface="나눔스퀘어_ac" panose="020B0600000101010101" pitchFamily="50" charset="-127"/>
-                          <a:ea typeface="나눔스퀘어_ac" panose="020B0600000101010101" pitchFamily="50" charset="-127"/>
-                          <a:cs typeface="+mn-cs"/>
-                        </a:rPr>
-                        <a:t>PLAN_NAME</a:t>
-                      </a:r>
-                    </a:p>
-                  </a:txBody>
-                  <a:tcPr anchor="ctr">
-                    <a:lnL w="12700" cap="flat" cmpd="sng" algn="ctr">
-                      <a:solidFill>
-                        <a:schemeClr val="tx1"/>
-                      </a:solidFill>
-                      <a:prstDash val="solid"/>
-                      <a:round/>
-                      <a:headEnd type="none" w="med" len="med"/>
-                      <a:tailEnd type="none" w="med" len="med"/>
-                    </a:lnL>
-                    <a:lnR w="12700" cap="flat" cmpd="sng" algn="ctr">
-                      <a:solidFill>
-                        <a:schemeClr val="tx1"/>
-                      </a:solidFill>
-                      <a:prstDash val="solid"/>
-                      <a:round/>
-                      <a:headEnd type="none" w="med" len="med"/>
-                      <a:tailEnd type="none" w="med" len="med"/>
-                    </a:lnR>
-                    <a:lnT w="12700" cap="flat" cmpd="sng" algn="ctr">
-                      <a:solidFill>
-                        <a:schemeClr val="tx1"/>
-                      </a:solidFill>
-                      <a:prstDash val="solid"/>
-                      <a:round/>
-                      <a:headEnd type="none" w="med" len="med"/>
-                      <a:tailEnd type="none" w="med" len="med"/>
-                    </a:lnT>
-                    <a:lnB w="12700" cap="flat" cmpd="sng" algn="ctr">
-                      <a:solidFill>
-                        <a:schemeClr val="tx1"/>
-                      </a:solidFill>
-                      <a:prstDash val="solid"/>
-                      <a:round/>
-                      <a:headEnd type="none" w="med" len="med"/>
-                      <a:tailEnd type="none" w="med" len="med"/>
-                    </a:lnB>
-                    <a:solidFill>
-                      <a:schemeClr val="bg1"/>
-                    </a:solidFill>
-                  </a:tcPr>
-                </a:tc>
-                <a:tc>
-                  <a:txBody>
-                    <a:bodyPr/>
-                    <a:lstStyle/>
-                    <a:p>
-                      <a:pPr marL="0" marR="0" lvl="0" indent="0" algn="ctr" defTabSz="685800" rtl="0" eaLnBrk="1" fontAlgn="auto" latinLnBrk="1" hangingPunct="1">
-                        <a:lnSpc>
-                          <a:spcPct val="100000"/>
-                        </a:lnSpc>
-                        <a:spcBef>
-                          <a:spcPts val="0"/>
-                        </a:spcBef>
-                        <a:spcAft>
-                          <a:spcPts val="0"/>
-                        </a:spcAft>
-                        <a:buClrTx/>
-                        <a:buSzTx/>
-                        <a:buFontTx/>
-                        <a:buNone/>
-                        <a:tabLst/>
-                        <a:defRPr/>
-                      </a:pPr>
-                      <a:endParaRPr lang="ko-KR" altLang="en-US" sz="900" kern="1200" dirty="0">
-                        <a:solidFill>
-                          <a:schemeClr val="tx1"/>
-                        </a:solidFill>
-                        <a:latin typeface="나눔스퀘어_ac" panose="020B0600000101010101" pitchFamily="50" charset="-127"/>
-                        <a:ea typeface="나눔스퀘어_ac" panose="020B0600000101010101" pitchFamily="50" charset="-127"/>
-                        <a:cs typeface="+mn-cs"/>
-                      </a:endParaRPr>
-                    </a:p>
-                  </a:txBody>
-                  <a:tcPr anchor="ctr">
-                    <a:lnL w="12700" cap="flat" cmpd="sng" algn="ctr">
-                      <a:solidFill>
-                        <a:schemeClr val="tx1"/>
-                      </a:solidFill>
-                      <a:prstDash val="solid"/>
-                      <a:round/>
-                      <a:headEnd type="none" w="med" len="med"/>
-                      <a:tailEnd type="none" w="med" len="med"/>
-                    </a:lnL>
-                    <a:lnR w="12700" cap="flat" cmpd="sng" algn="ctr">
-                      <a:solidFill>
-                        <a:schemeClr val="tx1"/>
-                      </a:solidFill>
-                      <a:prstDash val="solid"/>
-                      <a:round/>
-                      <a:headEnd type="none" w="med" len="med"/>
-                      <a:tailEnd type="none" w="med" len="med"/>
-                    </a:lnR>
-                    <a:lnT w="12700" cap="flat" cmpd="sng" algn="ctr">
-                      <a:solidFill>
-                        <a:schemeClr val="tx1"/>
-                      </a:solidFill>
-                      <a:prstDash val="solid"/>
-                      <a:round/>
-                      <a:headEnd type="none" w="med" len="med"/>
-                      <a:tailEnd type="none" w="med" len="med"/>
-                    </a:lnT>
-                    <a:lnB w="12700" cap="flat" cmpd="sng" algn="ctr">
-                      <a:solidFill>
-                        <a:schemeClr val="tx1"/>
-                      </a:solidFill>
-                      <a:prstDash val="solid"/>
-                      <a:round/>
-                      <a:headEnd type="none" w="med" len="med"/>
-                      <a:tailEnd type="none" w="med" len="med"/>
-                    </a:lnB>
-                    <a:solidFill>
-                      <a:schemeClr val="bg1"/>
-                    </a:solidFill>
-                  </a:tcPr>
-                </a:tc>
-                <a:tc>
-                  <a:txBody>
-                    <a:bodyPr/>
-                    <a:lstStyle/>
-                    <a:p>
-                      <a:pPr marL="0" marR="0" lvl="0" indent="0" algn="ctr" defTabSz="685800" rtl="0" eaLnBrk="1" fontAlgn="auto" latinLnBrk="1" hangingPunct="1">
-                        <a:lnSpc>
-                          <a:spcPct val="100000"/>
-                        </a:lnSpc>
-                        <a:spcBef>
-                          <a:spcPts val="0"/>
-                        </a:spcBef>
-                        <a:spcAft>
-                          <a:spcPts val="0"/>
-                        </a:spcAft>
-                        <a:buClrTx/>
-                        <a:buSzTx/>
-                        <a:buFontTx/>
-                        <a:buNone/>
-                        <a:tabLst/>
-                        <a:defRPr/>
-                      </a:pPr>
-                      <a:r>
-                        <a:rPr lang="en-US" altLang="ko-KR" sz="900" kern="1200" dirty="0">
-                          <a:solidFill>
-                            <a:schemeClr val="tx1"/>
-                          </a:solidFill>
-                          <a:latin typeface="나눔스퀘어_ac" panose="020B0600000101010101" pitchFamily="50" charset="-127"/>
-                          <a:ea typeface="나눔스퀘어_ac" panose="020B0600000101010101" pitchFamily="50" charset="-127"/>
-                          <a:cs typeface="+mn-cs"/>
-                        </a:rPr>
-                        <a:t>VARCHAR2(30)</a:t>
-                      </a:r>
-                      <a:endParaRPr lang="ko-KR" altLang="en-US" sz="900" kern="1200" dirty="0">
-                        <a:solidFill>
-                          <a:schemeClr val="tx1"/>
-                        </a:solidFill>
-                        <a:latin typeface="나눔스퀘어_ac" panose="020B0600000101010101" pitchFamily="50" charset="-127"/>
-                        <a:ea typeface="나눔스퀘어_ac" panose="020B0600000101010101" pitchFamily="50" charset="-127"/>
-                        <a:cs typeface="+mn-cs"/>
-                      </a:endParaRPr>
-                    </a:p>
-                  </a:txBody>
-                  <a:tcPr anchor="ctr">
-                    <a:lnL w="12700" cap="flat" cmpd="sng" algn="ctr">
-                      <a:solidFill>
-                        <a:schemeClr val="tx1"/>
-                      </a:solidFill>
-                      <a:prstDash val="solid"/>
-                      <a:round/>
-                      <a:headEnd type="none" w="med" len="med"/>
-                      <a:tailEnd type="none" w="med" len="med"/>
-                    </a:lnL>
-                    <a:lnR w="12700" cap="flat" cmpd="sng" algn="ctr">
-                      <a:solidFill>
-                        <a:schemeClr val="tx1"/>
-                      </a:solidFill>
-                      <a:prstDash val="solid"/>
-                      <a:round/>
-                      <a:headEnd type="none" w="med" len="med"/>
-                      <a:tailEnd type="none" w="med" len="med"/>
-                    </a:lnR>
-                    <a:lnT w="12700" cap="flat" cmpd="sng" algn="ctr">
-                      <a:solidFill>
-                        <a:schemeClr val="tx1"/>
-                      </a:solidFill>
-                      <a:prstDash val="solid"/>
-                      <a:round/>
-                      <a:headEnd type="none" w="med" len="med"/>
-                      <a:tailEnd type="none" w="med" len="med"/>
-                    </a:lnT>
-                    <a:lnB w="12700" cap="flat" cmpd="sng" algn="ctr">
-                      <a:solidFill>
-                        <a:schemeClr val="tx1"/>
-                      </a:solidFill>
-                      <a:prstDash val="solid"/>
-                      <a:round/>
-                      <a:headEnd type="none" w="med" len="med"/>
-                      <a:tailEnd type="none" w="med" len="med"/>
-                    </a:lnB>
-                    <a:solidFill>
-                      <a:schemeClr val="bg1"/>
-                    </a:solidFill>
-                  </a:tcPr>
-                </a:tc>
-                <a:extLst>
-                  <a:ext uri="{0D108BD9-81ED-4DB2-BD59-A6C34878D82A}">
-                    <a16:rowId xmlns:a16="http://schemas.microsoft.com/office/drawing/2014/main" val="826941391"/>
-                  </a:ext>
-                </a:extLst>
-              </a:tr>
-              <a:tr h="204124">
-                <a:tc>
-                  <a:txBody>
-                    <a:bodyPr/>
-                    <a:lstStyle/>
-                    <a:p>
-                      <a:pPr marL="0" algn="ctr" defTabSz="914400" rtl="0" eaLnBrk="1" latinLnBrk="1" hangingPunct="1"/>
-                      <a:r>
-                        <a:rPr lang="en-US" altLang="ko-KR" sz="900" kern="1200" dirty="0">
-                          <a:solidFill>
-                            <a:schemeClr val="tx1"/>
-                          </a:solidFill>
-                          <a:latin typeface="나눔스퀘어_ac" panose="020B0600000101010101" pitchFamily="50" charset="-127"/>
-                          <a:ea typeface="나눔스퀘어_ac" panose="020B0600000101010101" pitchFamily="50" charset="-127"/>
-                          <a:cs typeface="+mn-cs"/>
-                        </a:rPr>
-                        <a:t>HOST_ID</a:t>
-                      </a:r>
-                    </a:p>
-                  </a:txBody>
-                  <a:tcPr anchor="ctr">
-                    <a:lnL w="12700" cap="flat" cmpd="sng" algn="ctr">
-                      <a:solidFill>
-                        <a:schemeClr val="tx1"/>
-                      </a:solidFill>
-                      <a:prstDash val="solid"/>
-                      <a:round/>
-                      <a:headEnd type="none" w="med" len="med"/>
-                      <a:tailEnd type="none" w="med" len="med"/>
-                    </a:lnL>
-                    <a:lnR w="12700" cap="flat" cmpd="sng" algn="ctr">
-                      <a:solidFill>
-                        <a:schemeClr val="tx1"/>
-                      </a:solidFill>
-                      <a:prstDash val="solid"/>
-                      <a:round/>
-                      <a:headEnd type="none" w="med" len="med"/>
-                      <a:tailEnd type="none" w="med" len="med"/>
-                    </a:lnR>
-                    <a:lnT w="12700" cap="flat" cmpd="sng" algn="ctr">
-                      <a:solidFill>
-                        <a:schemeClr val="tx1"/>
-                      </a:solidFill>
-                      <a:prstDash val="solid"/>
-                      <a:round/>
-                      <a:headEnd type="none" w="med" len="med"/>
-                      <a:tailEnd type="none" w="med" len="med"/>
-                    </a:lnT>
-                    <a:lnB w="12700" cap="flat" cmpd="sng" algn="ctr">
-                      <a:solidFill>
-                        <a:schemeClr val="tx1"/>
-                      </a:solidFill>
-                      <a:prstDash val="solid"/>
-                      <a:round/>
-                      <a:headEnd type="none" w="med" len="med"/>
-                      <a:tailEnd type="none" w="med" len="med"/>
-                    </a:lnB>
-                    <a:solidFill>
-                      <a:schemeClr val="bg1"/>
-                    </a:solidFill>
-                  </a:tcPr>
-                </a:tc>
-                <a:tc>
-                  <a:txBody>
-                    <a:bodyPr/>
-                    <a:lstStyle/>
-                    <a:p>
-                      <a:pPr marL="0" marR="0" lvl="0" indent="0" algn="ctr" defTabSz="685800" rtl="0" eaLnBrk="1" fontAlgn="auto" latinLnBrk="1" hangingPunct="1">
-                        <a:lnSpc>
-                          <a:spcPct val="100000"/>
-                        </a:lnSpc>
-                        <a:spcBef>
-                          <a:spcPts val="0"/>
-                        </a:spcBef>
-                        <a:spcAft>
-                          <a:spcPts val="0"/>
-                        </a:spcAft>
-                        <a:buClrTx/>
-                        <a:buSzTx/>
-                        <a:buFontTx/>
-                        <a:buNone/>
-                        <a:tabLst/>
-                        <a:defRPr/>
-                      </a:pPr>
-                      <a:r>
-                        <a:rPr lang="en-US" altLang="ko-KR" sz="900" kern="1200" dirty="0">
-                          <a:solidFill>
-                            <a:schemeClr val="tx1"/>
-                          </a:solidFill>
-                          <a:latin typeface="나눔스퀘어_ac" panose="020B0600000101010101" pitchFamily="50" charset="-127"/>
-                          <a:ea typeface="나눔스퀘어_ac" panose="020B0600000101010101" pitchFamily="50" charset="-127"/>
-                          <a:cs typeface="+mn-cs"/>
-                        </a:rPr>
-                        <a:t>FK, NOT NULL</a:t>
-                      </a:r>
-                      <a:endParaRPr lang="ko-KR" altLang="en-US" sz="900" kern="1200" dirty="0">
-                        <a:solidFill>
-                          <a:schemeClr val="tx1"/>
-                        </a:solidFill>
-                        <a:latin typeface="나눔스퀘어_ac" panose="020B0600000101010101" pitchFamily="50" charset="-127"/>
-                        <a:ea typeface="나눔스퀘어_ac" panose="020B0600000101010101" pitchFamily="50" charset="-127"/>
-                        <a:cs typeface="+mn-cs"/>
-                      </a:endParaRPr>
-                    </a:p>
-                  </a:txBody>
-                  <a:tcPr anchor="ctr">
-                    <a:lnL w="12700" cap="flat" cmpd="sng" algn="ctr">
-                      <a:solidFill>
-                        <a:schemeClr val="tx1"/>
-                      </a:solidFill>
-                      <a:prstDash val="solid"/>
-                      <a:round/>
-                      <a:headEnd type="none" w="med" len="med"/>
-                      <a:tailEnd type="none" w="med" len="med"/>
-                    </a:lnL>
-                    <a:lnR w="12700" cap="flat" cmpd="sng" algn="ctr">
-                      <a:solidFill>
-                        <a:schemeClr val="tx1"/>
-                      </a:solidFill>
-                      <a:prstDash val="solid"/>
-                      <a:round/>
-                      <a:headEnd type="none" w="med" len="med"/>
-                      <a:tailEnd type="none" w="med" len="med"/>
-                    </a:lnR>
-                    <a:lnT w="12700" cap="flat" cmpd="sng" algn="ctr">
-                      <a:solidFill>
-                        <a:schemeClr val="tx1"/>
-                      </a:solidFill>
-                      <a:prstDash val="solid"/>
-                      <a:round/>
-                      <a:headEnd type="none" w="med" len="med"/>
-                      <a:tailEnd type="none" w="med" len="med"/>
-                    </a:lnT>
-                    <a:lnB w="12700" cap="flat" cmpd="sng" algn="ctr">
-                      <a:solidFill>
-                        <a:schemeClr val="tx1"/>
-                      </a:solidFill>
-                      <a:prstDash val="solid"/>
-                      <a:round/>
-                      <a:headEnd type="none" w="med" len="med"/>
-                      <a:tailEnd type="none" w="med" len="med"/>
-                    </a:lnB>
-                    <a:solidFill>
-                      <a:schemeClr val="bg1"/>
-                    </a:solidFill>
-                  </a:tcPr>
-                </a:tc>
-                <a:tc>
-                  <a:txBody>
-                    <a:bodyPr/>
-                    <a:lstStyle/>
-                    <a:p>
-                      <a:pPr marL="0" marR="0" lvl="0" indent="0" algn="ctr" defTabSz="685800" rtl="0" eaLnBrk="1" fontAlgn="auto" latinLnBrk="1" hangingPunct="1">
-                        <a:lnSpc>
-                          <a:spcPct val="100000"/>
-                        </a:lnSpc>
-                        <a:spcBef>
-                          <a:spcPts val="0"/>
-                        </a:spcBef>
-                        <a:spcAft>
-                          <a:spcPts val="0"/>
-                        </a:spcAft>
-                        <a:buClrTx/>
-                        <a:buSzTx/>
-                        <a:buFontTx/>
-                        <a:buNone/>
-                        <a:tabLst/>
-                        <a:defRPr/>
-                      </a:pPr>
-                      <a:r>
-                        <a:rPr lang="en-US" altLang="ko-KR" sz="900" kern="1200" dirty="0">
-                          <a:solidFill>
-                            <a:schemeClr val="tx1"/>
-                          </a:solidFill>
-                          <a:latin typeface="나눔스퀘어_ac" panose="020B0600000101010101" pitchFamily="50" charset="-127"/>
-                          <a:ea typeface="나눔스퀘어_ac" panose="020B0600000101010101" pitchFamily="50" charset="-127"/>
-                          <a:cs typeface="+mn-cs"/>
-                        </a:rPr>
                         <a:t>VARCHAR2(30)</a:t>
                       </a:r>
                       <a:endParaRPr lang="ko-KR" altLang="en-US" sz="900" kern="1200" dirty="0">
@@ -8020,7 +8020,7 @@
           <p:nvPr>
             <p:extLst>
               <p:ext uri="{D42A27DB-BD31-4B8C-83A1-F6EECF244321}">
-                <p14:modId xmlns:p14="http://schemas.microsoft.com/office/powerpoint/2010/main" val="362050720"/>
+                <p14:modId xmlns:p14="http://schemas.microsoft.com/office/powerpoint/2010/main" val="153042135"/>
               </p:ext>
             </p:extLst>
           </p:nvPr>
@@ -8736,7 +8736,7 @@
                           <a:ea typeface="나눔스퀘어_ac" panose="020B0600000101010101" pitchFamily="50" charset="-127"/>
                           <a:cs typeface="+mn-cs"/>
                         </a:rPr>
-                        <a:t>NOT NULL</a:t>
+                        <a:t>PK</a:t>
                       </a:r>
                       <a:endParaRPr lang="ko-KR" altLang="en-US" sz="900" kern="1200" dirty="0">
                         <a:solidFill>
@@ -10002,7 +10002,7 @@
           <p:nvPr>
             <p:extLst>
               <p:ext uri="{D42A27DB-BD31-4B8C-83A1-F6EECF244321}">
-                <p14:modId xmlns:p14="http://schemas.microsoft.com/office/powerpoint/2010/main" val="253797637"/>
+                <p14:modId xmlns:p14="http://schemas.microsoft.com/office/powerpoint/2010/main" val="1920453666"/>
               </p:ext>
             </p:extLst>
           </p:nvPr>
@@ -10783,16 +10783,22 @@
                           <a:solidFill>
                             <a:schemeClr val="tx1"/>
                           </a:solidFill>
+                          <a:highlight>
+                            <a:srgbClr val="FFFF00"/>
+                          </a:highlight>
                           <a:latin typeface="나눔스퀘어_ac" panose="020B0600000101010101" pitchFamily="50" charset="-127"/>
                           <a:ea typeface="나눔스퀘어_ac" panose="020B0600000101010101" pitchFamily="50" charset="-127"/>
                           <a:cs typeface="+mn-cs"/>
                         </a:rPr>
-                        <a:t>NUMBER(3,15)</a:t>
+                        <a:t>NUMBER()</a:t>
                       </a:r>
                       <a:endParaRPr lang="ko-KR" altLang="en-US" sz="900" kern="1200" dirty="0">
                         <a:solidFill>
                           <a:schemeClr val="tx1"/>
                         </a:solidFill>
+                        <a:highlight>
+                          <a:srgbClr val="FFFF00"/>
+                        </a:highlight>
                         <a:latin typeface="나눔스퀘어_ac" panose="020B0600000101010101" pitchFamily="50" charset="-127"/>
                         <a:ea typeface="나눔스퀘어_ac" panose="020B0600000101010101" pitchFamily="50" charset="-127"/>
                         <a:cs typeface="+mn-cs"/>
@@ -11021,27 +11027,22 @@
                           <a:solidFill>
                             <a:schemeClr val="tx1"/>
                           </a:solidFill>
+                          <a:highlight>
+                            <a:srgbClr val="FFFF00"/>
+                          </a:highlight>
                           <a:latin typeface="나눔스퀘어_ac" panose="020B0600000101010101" pitchFamily="50" charset="-127"/>
                           <a:ea typeface="나눔스퀘어_ac" panose="020B0600000101010101" pitchFamily="50" charset="-127"/>
                           <a:cs typeface="+mn-cs"/>
                         </a:rPr>
-                        <a:t>NUMBER</a:t>
-                      </a:r>
-                      <a:r>
-                        <a:rPr lang="en-US" altLang="ko-KR" sz="900" kern="1200">
-                          <a:solidFill>
-                            <a:schemeClr val="tx1"/>
-                          </a:solidFill>
-                          <a:latin typeface="나눔스퀘어_ac" panose="020B0600000101010101" pitchFamily="50" charset="-127"/>
-                          <a:ea typeface="나눔스퀘어_ac" panose="020B0600000101010101" pitchFamily="50" charset="-127"/>
-                          <a:cs typeface="+mn-cs"/>
-                        </a:rPr>
-                        <a:t>(3,15)</a:t>
+                        <a:t>NUMBER()</a:t>
                       </a:r>
                       <a:endParaRPr lang="ko-KR" altLang="en-US" sz="900" kern="1200" dirty="0">
                         <a:solidFill>
                           <a:schemeClr val="tx1"/>
                         </a:solidFill>
+                        <a:highlight>
+                          <a:srgbClr val="FFFF00"/>
+                        </a:highlight>
                         <a:latin typeface="나눔스퀘어_ac" panose="020B0600000101010101" pitchFamily="50" charset="-127"/>
                         <a:ea typeface="나눔스퀘어_ac" panose="020B0600000101010101" pitchFamily="50" charset="-127"/>
                         <a:cs typeface="+mn-cs"/>
@@ -11115,7 +11116,7 @@
           <p:nvPr>
             <p:extLst>
               <p:ext uri="{D42A27DB-BD31-4B8C-83A1-F6EECF244321}">
-                <p14:modId xmlns:p14="http://schemas.microsoft.com/office/powerpoint/2010/main" val="3879135774"/>
+                <p14:modId xmlns:p14="http://schemas.microsoft.com/office/powerpoint/2010/main" val="1992848320"/>
               </p:ext>
             </p:extLst>
           </p:nvPr>
@@ -13236,7 +13237,7 @@
                     <a:p>
                       <a:pPr algn="ctr" latinLnBrk="1"/>
                       <a:r>
-                        <a:rPr lang="en-US" altLang="ko-KR" sz="900" b="0">
+                        <a:rPr lang="en-US" altLang="ko-KR" sz="900" b="0" dirty="0">
                           <a:solidFill>
                             <a:schemeClr val="tx1"/>
                           </a:solidFill>
@@ -14946,14 +14947,14 @@
           <p:nvPr>
             <p:extLst>
               <p:ext uri="{D42A27DB-BD31-4B8C-83A1-F6EECF244321}">
-                <p14:modId xmlns:p14="http://schemas.microsoft.com/office/powerpoint/2010/main" val="2625462345"/>
+                <p14:modId xmlns:p14="http://schemas.microsoft.com/office/powerpoint/2010/main" val="2125843444"/>
               </p:ext>
             </p:extLst>
           </p:nvPr>
         </p:nvGraphicFramePr>
         <p:xfrm>
           <a:off x="8839456" y="4410998"/>
-          <a:ext cx="3215640" cy="2194560"/>
+          <a:ext cx="3355340" cy="2194560"/>
         </p:xfrm>
         <a:graphic>
           <a:graphicData uri="http://schemas.openxmlformats.org/drawingml/2006/table">
@@ -14962,7 +14963,7 @@
                 <a:tableStyleId>{5C22544A-7EE6-4342-B048-85BDC9FD1C3A}</a:tableStyleId>
               </a:tblPr>
               <a:tblGrid>
-                <a:gridCol w="1152842">
+                <a:gridCol w="1292542">
                   <a:extLst>
                     <a:ext uri="{9D8B030D-6E8A-4147-A177-3AD203B41FA5}">
                       <a16:colId xmlns:a16="http://schemas.microsoft.com/office/drawing/2014/main" val="332679272"/>
@@ -15347,7 +15348,7 @@
                           <a:ea typeface="나눔스퀘어_ac" panose="020B0600000101010101" pitchFamily="50" charset="-127"/>
                           <a:cs typeface="+mn-cs"/>
                         </a:rPr>
-                        <a:t>RESTUARANTS_ID</a:t>
+                        <a:t>RESTUARANT_ID</a:t>
                       </a:r>
                     </a:p>
                   </a:txBody>
@@ -15837,7 +15838,7 @@
                           <a:ea typeface="나눔스퀘어_ac" panose="020B0600000101010101" pitchFamily="50" charset="-127"/>
                           <a:cs typeface="+mn-cs"/>
                         </a:rPr>
-                        <a:t>CAFE_NAME</a:t>
+                        <a:t>RESTAURANT_NAME</a:t>
                       </a:r>
                     </a:p>
                   </a:txBody>
@@ -16969,6 +16970,2005 @@
                 <a:extLst>
                   <a:ext uri="{0D108BD9-81ED-4DB2-BD59-A6C34878D82A}">
                     <a16:rowId xmlns:a16="http://schemas.microsoft.com/office/drawing/2014/main" val="2586189320"/>
+                  </a:ext>
+                </a:extLst>
+              </a:tr>
+            </a:tbl>
+          </a:graphicData>
+        </a:graphic>
+      </p:graphicFrame>
+      <p:graphicFrame>
+        <p:nvGraphicFramePr>
+          <p:cNvPr id="13" name="표 12">
+            <a:extLst>
+              <a:ext uri="{FF2B5EF4-FFF2-40B4-BE49-F238E27FC236}">
+                <a16:creationId xmlns:a16="http://schemas.microsoft.com/office/drawing/2014/main" id="{AFA69EA2-D8A1-4B62-9C2B-EC3A2F90A965}"/>
+              </a:ext>
+            </a:extLst>
+          </p:cNvPr>
+          <p:cNvGraphicFramePr>
+            <a:graphicFrameLocks noGrp="1"/>
+          </p:cNvGraphicFramePr>
+          <p:nvPr>
+            <p:extLst>
+              <p:ext uri="{D42A27DB-BD31-4B8C-83A1-F6EECF244321}">
+                <p14:modId xmlns:p14="http://schemas.microsoft.com/office/powerpoint/2010/main" val="454485919"/>
+              </p:ext>
+            </p:extLst>
+          </p:nvPr>
+        </p:nvGraphicFramePr>
+        <p:xfrm>
+          <a:off x="-1322842" y="4401675"/>
+          <a:ext cx="3255327" cy="2057400"/>
+        </p:xfrm>
+        <a:graphic>
+          <a:graphicData uri="http://schemas.openxmlformats.org/drawingml/2006/table">
+            <a:tbl>
+              <a:tblPr firstRow="1" bandRow="1">
+                <a:tableStyleId>{5C22544A-7EE6-4342-B048-85BDC9FD1C3A}</a:tableStyleId>
+              </a:tblPr>
+              <a:tblGrid>
+                <a:gridCol w="1292542">
+                  <a:extLst>
+                    <a:ext uri="{9D8B030D-6E8A-4147-A177-3AD203B41FA5}">
+                      <a16:colId xmlns:a16="http://schemas.microsoft.com/office/drawing/2014/main" val="332679272"/>
+                    </a:ext>
+                  </a:extLst>
+                </a:gridCol>
+                <a:gridCol w="890905">
+                  <a:extLst>
+                    <a:ext uri="{9D8B030D-6E8A-4147-A177-3AD203B41FA5}">
+                      <a16:colId xmlns:a16="http://schemas.microsoft.com/office/drawing/2014/main" val="1980556319"/>
+                    </a:ext>
+                  </a:extLst>
+                </a:gridCol>
+                <a:gridCol w="1071880">
+                  <a:extLst>
+                    <a:ext uri="{9D8B030D-6E8A-4147-A177-3AD203B41FA5}">
+                      <a16:colId xmlns:a16="http://schemas.microsoft.com/office/drawing/2014/main" val="1822850246"/>
+                    </a:ext>
+                  </a:extLst>
+                </a:gridCol>
+              </a:tblGrid>
+              <a:tr h="204124">
+                <a:tc gridSpan="3">
+                  <a:txBody>
+                    <a:bodyPr/>
+                    <a:lstStyle/>
+                    <a:p>
+                      <a:pPr algn="ctr" latinLnBrk="1"/>
+                      <a:r>
+                        <a:rPr lang="en-US" altLang="ko-KR" sz="900" b="0" dirty="0">
+                          <a:solidFill>
+                            <a:schemeClr val="tx1"/>
+                          </a:solidFill>
+                          <a:latin typeface="나눔스퀘어_ac ExtraBold" panose="020B0600000101010101" pitchFamily="50" charset="-127"/>
+                          <a:ea typeface="나눔스퀘어_ac ExtraBold" panose="020B0600000101010101" pitchFamily="50" charset="-127"/>
+                        </a:rPr>
+                        <a:t>SAFETY_RESTAURANTS</a:t>
+                      </a:r>
+                    </a:p>
+                  </a:txBody>
+                  <a:tcPr anchor="ctr">
+                    <a:lnL w="12700" cap="flat" cmpd="sng" algn="ctr">
+                      <a:solidFill>
+                        <a:schemeClr val="tx1"/>
+                      </a:solidFill>
+                      <a:prstDash val="solid"/>
+                      <a:round/>
+                      <a:headEnd type="none" w="med" len="med"/>
+                      <a:tailEnd type="none" w="med" len="med"/>
+                    </a:lnL>
+                    <a:lnR w="12700" cap="flat" cmpd="sng" algn="ctr">
+                      <a:solidFill>
+                        <a:schemeClr val="tx1"/>
+                      </a:solidFill>
+                      <a:prstDash val="solid"/>
+                      <a:round/>
+                      <a:headEnd type="none" w="med" len="med"/>
+                      <a:tailEnd type="none" w="med" len="med"/>
+                    </a:lnR>
+                    <a:lnT w="12700" cap="flat" cmpd="sng" algn="ctr">
+                      <a:solidFill>
+                        <a:schemeClr val="tx1"/>
+                      </a:solidFill>
+                      <a:prstDash val="solid"/>
+                      <a:round/>
+                      <a:headEnd type="none" w="med" len="med"/>
+                      <a:tailEnd type="none" w="med" len="med"/>
+                    </a:lnT>
+                    <a:lnB w="12700" cap="flat" cmpd="sng" algn="ctr">
+                      <a:solidFill>
+                        <a:schemeClr val="tx1"/>
+                      </a:solidFill>
+                      <a:prstDash val="solid"/>
+                      <a:round/>
+                      <a:headEnd type="none" w="med" len="med"/>
+                      <a:tailEnd type="none" w="med" len="med"/>
+                    </a:lnB>
+                    <a:solidFill>
+                      <a:schemeClr val="bg1">
+                        <a:lumMod val="85000"/>
+                      </a:schemeClr>
+                    </a:solidFill>
+                  </a:tcPr>
+                </a:tc>
+                <a:tc hMerge="1">
+                  <a:txBody>
+                    <a:bodyPr/>
+                    <a:lstStyle/>
+                    <a:p>
+                      <a:pPr latinLnBrk="1"/>
+                      <a:endParaRPr lang="ko-KR" altLang="en-US"/>
+                    </a:p>
+                  </a:txBody>
+                  <a:tcPr/>
+                </a:tc>
+                <a:tc hMerge="1">
+                  <a:txBody>
+                    <a:bodyPr/>
+                    <a:lstStyle/>
+                    <a:p>
+                      <a:pPr algn="ctr" latinLnBrk="1"/>
+                      <a:endParaRPr lang="en-US" altLang="ko-KR" sz="1000" b="0" dirty="0">
+                        <a:solidFill>
+                          <a:schemeClr val="tx1"/>
+                        </a:solidFill>
+                        <a:latin typeface="나눔스퀘어_ac Bold" panose="020B0600000101010101" pitchFamily="50" charset="-127"/>
+                        <a:ea typeface="나눔스퀘어_ac Bold" panose="020B0600000101010101" pitchFamily="50" charset="-127"/>
+                      </a:endParaRPr>
+                    </a:p>
+                  </a:txBody>
+                  <a:tcPr anchor="ctr">
+                    <a:lnL w="12700" cap="flat" cmpd="sng" algn="ctr">
+                      <a:solidFill>
+                        <a:schemeClr val="tx1"/>
+                      </a:solidFill>
+                      <a:prstDash val="solid"/>
+                      <a:round/>
+                      <a:headEnd type="none" w="med" len="med"/>
+                      <a:tailEnd type="none" w="med" len="med"/>
+                    </a:lnL>
+                    <a:lnR w="12700" cap="flat" cmpd="sng" algn="ctr">
+                      <a:solidFill>
+                        <a:schemeClr val="tx1"/>
+                      </a:solidFill>
+                      <a:prstDash val="solid"/>
+                      <a:round/>
+                      <a:headEnd type="none" w="med" len="med"/>
+                      <a:tailEnd type="none" w="med" len="med"/>
+                    </a:lnR>
+                    <a:lnT w="12700" cap="flat" cmpd="sng" algn="ctr">
+                      <a:solidFill>
+                        <a:schemeClr val="tx1"/>
+                      </a:solidFill>
+                      <a:prstDash val="solid"/>
+                      <a:round/>
+                      <a:headEnd type="none" w="med" len="med"/>
+                      <a:tailEnd type="none" w="med" len="med"/>
+                    </a:lnT>
+                    <a:lnB w="12700" cap="flat" cmpd="sng" algn="ctr">
+                      <a:solidFill>
+                        <a:schemeClr val="tx1"/>
+                      </a:solidFill>
+                      <a:prstDash val="solid"/>
+                      <a:round/>
+                      <a:headEnd type="none" w="med" len="med"/>
+                      <a:tailEnd type="none" w="med" len="med"/>
+                    </a:lnB>
+                    <a:solidFill>
+                      <a:schemeClr val="bg1">
+                        <a:lumMod val="85000"/>
+                      </a:schemeClr>
+                    </a:solidFill>
+                  </a:tcPr>
+                </a:tc>
+                <a:extLst>
+                  <a:ext uri="{0D108BD9-81ED-4DB2-BD59-A6C34878D82A}">
+                    <a16:rowId xmlns:a16="http://schemas.microsoft.com/office/drawing/2014/main" val="2883612100"/>
+                  </a:ext>
+                </a:extLst>
+              </a:tr>
+              <a:tr h="204124">
+                <a:tc>
+                  <a:txBody>
+                    <a:bodyPr/>
+                    <a:lstStyle/>
+                    <a:p>
+                      <a:pPr algn="ctr" latinLnBrk="1"/>
+                      <a:r>
+                        <a:rPr lang="en-US" altLang="ko-KR" sz="900" b="0" dirty="0">
+                          <a:solidFill>
+                            <a:schemeClr val="tx1"/>
+                          </a:solidFill>
+                          <a:latin typeface="나눔스퀘어_ac" panose="020B0600000101010101" pitchFamily="50" charset="-127"/>
+                          <a:ea typeface="나눔스퀘어_ac" panose="020B0600000101010101" pitchFamily="50" charset="-127"/>
+                        </a:rPr>
+                        <a:t>COLUMN</a:t>
+                      </a:r>
+                      <a:endParaRPr lang="ko-KR" altLang="en-US" sz="900" b="0" dirty="0">
+                        <a:solidFill>
+                          <a:schemeClr val="tx1"/>
+                        </a:solidFill>
+                        <a:latin typeface="나눔스퀘어_ac" panose="020B0600000101010101" pitchFamily="50" charset="-127"/>
+                        <a:ea typeface="나눔스퀘어_ac" panose="020B0600000101010101" pitchFamily="50" charset="-127"/>
+                      </a:endParaRPr>
+                    </a:p>
+                  </a:txBody>
+                  <a:tcPr anchor="ctr">
+                    <a:lnL w="12700" cap="flat" cmpd="sng" algn="ctr">
+                      <a:solidFill>
+                        <a:schemeClr val="tx1"/>
+                      </a:solidFill>
+                      <a:prstDash val="solid"/>
+                      <a:round/>
+                      <a:headEnd type="none" w="med" len="med"/>
+                      <a:tailEnd type="none" w="med" len="med"/>
+                    </a:lnL>
+                    <a:lnR w="12700" cap="flat" cmpd="sng" algn="ctr">
+                      <a:solidFill>
+                        <a:schemeClr val="tx1"/>
+                      </a:solidFill>
+                      <a:prstDash val="solid"/>
+                      <a:round/>
+                      <a:headEnd type="none" w="med" len="med"/>
+                      <a:tailEnd type="none" w="med" len="med"/>
+                    </a:lnR>
+                    <a:lnT w="12700" cap="flat" cmpd="sng" algn="ctr">
+                      <a:solidFill>
+                        <a:schemeClr val="tx1"/>
+                      </a:solidFill>
+                      <a:prstDash val="solid"/>
+                      <a:round/>
+                      <a:headEnd type="none" w="med" len="med"/>
+                      <a:tailEnd type="none" w="med" len="med"/>
+                    </a:lnT>
+                    <a:lnB w="12700" cap="flat" cmpd="sng" algn="ctr">
+                      <a:solidFill>
+                        <a:schemeClr val="tx1"/>
+                      </a:solidFill>
+                      <a:prstDash val="solid"/>
+                      <a:round/>
+                      <a:headEnd type="none" w="med" len="med"/>
+                      <a:tailEnd type="none" w="med" len="med"/>
+                    </a:lnB>
+                    <a:solidFill>
+                      <a:srgbClr val="D9D9D9"/>
+                    </a:solidFill>
+                  </a:tcPr>
+                </a:tc>
+                <a:tc>
+                  <a:txBody>
+                    <a:bodyPr/>
+                    <a:lstStyle/>
+                    <a:p>
+                      <a:pPr algn="ctr" latinLnBrk="1"/>
+                      <a:r>
+                        <a:rPr lang="en-US" altLang="ko-KR" sz="900" b="0" dirty="0">
+                          <a:solidFill>
+                            <a:schemeClr val="tx1"/>
+                          </a:solidFill>
+                          <a:latin typeface="나눔스퀘어_ac" panose="020B0600000101010101" pitchFamily="50" charset="-127"/>
+                          <a:ea typeface="나눔스퀘어_ac" panose="020B0600000101010101" pitchFamily="50" charset="-127"/>
+                        </a:rPr>
+                        <a:t>CONSTRAINT</a:t>
+                      </a:r>
+                      <a:endParaRPr lang="ko-KR" altLang="en-US" sz="900" b="0" dirty="0">
+                        <a:solidFill>
+                          <a:schemeClr val="tx1"/>
+                        </a:solidFill>
+                        <a:latin typeface="나눔스퀘어_ac" panose="020B0600000101010101" pitchFamily="50" charset="-127"/>
+                        <a:ea typeface="나눔스퀘어_ac" panose="020B0600000101010101" pitchFamily="50" charset="-127"/>
+                      </a:endParaRPr>
+                    </a:p>
+                  </a:txBody>
+                  <a:tcPr anchor="ctr">
+                    <a:lnL w="12700" cap="flat" cmpd="sng" algn="ctr">
+                      <a:solidFill>
+                        <a:schemeClr val="tx1"/>
+                      </a:solidFill>
+                      <a:prstDash val="solid"/>
+                      <a:round/>
+                      <a:headEnd type="none" w="med" len="med"/>
+                      <a:tailEnd type="none" w="med" len="med"/>
+                    </a:lnL>
+                    <a:lnR w="12700" cap="flat" cmpd="sng" algn="ctr">
+                      <a:solidFill>
+                        <a:schemeClr val="tx1"/>
+                      </a:solidFill>
+                      <a:prstDash val="solid"/>
+                      <a:round/>
+                      <a:headEnd type="none" w="med" len="med"/>
+                      <a:tailEnd type="none" w="med" len="med"/>
+                    </a:lnR>
+                    <a:lnT w="12700" cap="flat" cmpd="sng" algn="ctr">
+                      <a:solidFill>
+                        <a:schemeClr val="tx1"/>
+                      </a:solidFill>
+                      <a:prstDash val="solid"/>
+                      <a:round/>
+                      <a:headEnd type="none" w="med" len="med"/>
+                      <a:tailEnd type="none" w="med" len="med"/>
+                    </a:lnT>
+                    <a:lnB w="12700" cap="flat" cmpd="sng" algn="ctr">
+                      <a:solidFill>
+                        <a:schemeClr val="tx1"/>
+                      </a:solidFill>
+                      <a:prstDash val="solid"/>
+                      <a:round/>
+                      <a:headEnd type="none" w="med" len="med"/>
+                      <a:tailEnd type="none" w="med" len="med"/>
+                    </a:lnB>
+                    <a:solidFill>
+                      <a:srgbClr val="D9D9D9"/>
+                    </a:solidFill>
+                  </a:tcPr>
+                </a:tc>
+                <a:tc>
+                  <a:txBody>
+                    <a:bodyPr/>
+                    <a:lstStyle/>
+                    <a:p>
+                      <a:pPr algn="ctr" latinLnBrk="1"/>
+                      <a:r>
+                        <a:rPr lang="en-US" altLang="ko-KR" sz="900" b="0" dirty="0">
+                          <a:solidFill>
+                            <a:schemeClr val="tx1"/>
+                          </a:solidFill>
+                          <a:latin typeface="나눔스퀘어_ac" panose="020B0600000101010101" pitchFamily="50" charset="-127"/>
+                          <a:ea typeface="나눔스퀘어_ac" panose="020B0600000101010101" pitchFamily="50" charset="-127"/>
+                        </a:rPr>
+                        <a:t>TYPE</a:t>
+                      </a:r>
+                      <a:endParaRPr lang="ko-KR" altLang="en-US" sz="900" b="0" dirty="0">
+                        <a:solidFill>
+                          <a:schemeClr val="tx1"/>
+                        </a:solidFill>
+                        <a:latin typeface="나눔스퀘어_ac" panose="020B0600000101010101" pitchFamily="50" charset="-127"/>
+                        <a:ea typeface="나눔스퀘어_ac" panose="020B0600000101010101" pitchFamily="50" charset="-127"/>
+                      </a:endParaRPr>
+                    </a:p>
+                  </a:txBody>
+                  <a:tcPr anchor="ctr">
+                    <a:lnL w="12700" cap="flat" cmpd="sng" algn="ctr">
+                      <a:solidFill>
+                        <a:schemeClr val="tx1"/>
+                      </a:solidFill>
+                      <a:prstDash val="solid"/>
+                      <a:round/>
+                      <a:headEnd type="none" w="med" len="med"/>
+                      <a:tailEnd type="none" w="med" len="med"/>
+                    </a:lnL>
+                    <a:lnR w="12700" cap="flat" cmpd="sng" algn="ctr">
+                      <a:solidFill>
+                        <a:schemeClr val="tx1"/>
+                      </a:solidFill>
+                      <a:prstDash val="solid"/>
+                      <a:round/>
+                      <a:headEnd type="none" w="med" len="med"/>
+                      <a:tailEnd type="none" w="med" len="med"/>
+                    </a:lnR>
+                    <a:lnT w="12700" cap="flat" cmpd="sng" algn="ctr">
+                      <a:solidFill>
+                        <a:schemeClr val="tx1"/>
+                      </a:solidFill>
+                      <a:prstDash val="solid"/>
+                      <a:round/>
+                      <a:headEnd type="none" w="med" len="med"/>
+                      <a:tailEnd type="none" w="med" len="med"/>
+                    </a:lnT>
+                    <a:lnB w="12700" cap="flat" cmpd="sng" algn="ctr">
+                      <a:solidFill>
+                        <a:schemeClr val="tx1"/>
+                      </a:solidFill>
+                      <a:prstDash val="solid"/>
+                      <a:round/>
+                      <a:headEnd type="none" w="med" len="med"/>
+                      <a:tailEnd type="none" w="med" len="med"/>
+                    </a:lnB>
+                    <a:solidFill>
+                      <a:srgbClr val="D9D9D9"/>
+                    </a:solidFill>
+                  </a:tcPr>
+                </a:tc>
+                <a:extLst>
+                  <a:ext uri="{0D108BD9-81ED-4DB2-BD59-A6C34878D82A}">
+                    <a16:rowId xmlns:a16="http://schemas.microsoft.com/office/drawing/2014/main" val="1262701491"/>
+                  </a:ext>
+                </a:extLst>
+              </a:tr>
+              <a:tr h="204124">
+                <a:tc>
+                  <a:txBody>
+                    <a:bodyPr/>
+                    <a:lstStyle/>
+                    <a:p>
+                      <a:pPr marL="0" algn="ctr" defTabSz="914400" rtl="0" eaLnBrk="1" latinLnBrk="1" hangingPunct="1"/>
+                      <a:r>
+                        <a:rPr lang="en-US" altLang="ko-KR" sz="900" u="sng" kern="1200" dirty="0">
+                          <a:solidFill>
+                            <a:schemeClr val="tx1"/>
+                          </a:solidFill>
+                          <a:latin typeface="나눔스퀘어_ac" panose="020B0600000101010101" pitchFamily="50" charset="-127"/>
+                          <a:ea typeface="나눔스퀘어_ac" panose="020B0600000101010101" pitchFamily="50" charset="-127"/>
+                          <a:cs typeface="+mn-cs"/>
+                        </a:rPr>
+                        <a:t>RESTAURANT_ID</a:t>
+                      </a:r>
+                    </a:p>
+                  </a:txBody>
+                  <a:tcPr anchor="ctr">
+                    <a:lnL w="12700" cap="flat" cmpd="sng" algn="ctr">
+                      <a:solidFill>
+                        <a:schemeClr val="tx1"/>
+                      </a:solidFill>
+                      <a:prstDash val="solid"/>
+                      <a:round/>
+                      <a:headEnd type="none" w="med" len="med"/>
+                      <a:tailEnd type="none" w="med" len="med"/>
+                    </a:lnL>
+                    <a:lnR w="12700" cap="flat" cmpd="sng" algn="ctr">
+                      <a:solidFill>
+                        <a:schemeClr val="tx1"/>
+                      </a:solidFill>
+                      <a:prstDash val="solid"/>
+                      <a:round/>
+                      <a:headEnd type="none" w="med" len="med"/>
+                      <a:tailEnd type="none" w="med" len="med"/>
+                    </a:lnR>
+                    <a:lnT w="12700" cap="flat" cmpd="sng" algn="ctr">
+                      <a:solidFill>
+                        <a:schemeClr val="tx1"/>
+                      </a:solidFill>
+                      <a:prstDash val="solid"/>
+                      <a:round/>
+                      <a:headEnd type="none" w="med" len="med"/>
+                      <a:tailEnd type="none" w="med" len="med"/>
+                    </a:lnT>
+                    <a:lnB w="12700" cap="flat" cmpd="sng" algn="ctr">
+                      <a:solidFill>
+                        <a:schemeClr val="tx1"/>
+                      </a:solidFill>
+                      <a:prstDash val="solid"/>
+                      <a:round/>
+                      <a:headEnd type="none" w="med" len="med"/>
+                      <a:tailEnd type="none" w="med" len="med"/>
+                    </a:lnB>
+                    <a:solidFill>
+                      <a:schemeClr val="bg1"/>
+                    </a:solidFill>
+                  </a:tcPr>
+                </a:tc>
+                <a:tc>
+                  <a:txBody>
+                    <a:bodyPr/>
+                    <a:lstStyle/>
+                    <a:p>
+                      <a:pPr marL="0" marR="0" lvl="0" indent="0" algn="ctr" defTabSz="914400" rtl="0" eaLnBrk="1" fontAlgn="auto" latinLnBrk="1" hangingPunct="1">
+                        <a:lnSpc>
+                          <a:spcPct val="100000"/>
+                        </a:lnSpc>
+                        <a:spcBef>
+                          <a:spcPts val="0"/>
+                        </a:spcBef>
+                        <a:spcAft>
+                          <a:spcPts val="0"/>
+                        </a:spcAft>
+                        <a:buClrTx/>
+                        <a:buSzTx/>
+                        <a:buFontTx/>
+                        <a:buNone/>
+                        <a:tabLst/>
+                        <a:defRPr/>
+                      </a:pPr>
+                      <a:r>
+                        <a:rPr lang="en-US" altLang="ko-KR" sz="900" kern="1200" dirty="0">
+                          <a:solidFill>
+                            <a:schemeClr val="tx1"/>
+                          </a:solidFill>
+                          <a:latin typeface="나눔스퀘어_ac" panose="020B0600000101010101" pitchFamily="50" charset="-127"/>
+                          <a:ea typeface="나눔스퀘어_ac" panose="020B0600000101010101" pitchFamily="50" charset="-127"/>
+                          <a:cs typeface="+mn-cs"/>
+                        </a:rPr>
+                        <a:t>PK</a:t>
+                      </a:r>
+                      <a:endParaRPr lang="ko-KR" altLang="en-US" sz="900" kern="1200" dirty="0">
+                        <a:solidFill>
+                          <a:schemeClr val="tx1"/>
+                        </a:solidFill>
+                        <a:latin typeface="나눔스퀘어_ac" panose="020B0600000101010101" pitchFamily="50" charset="-127"/>
+                        <a:ea typeface="나눔스퀘어_ac" panose="020B0600000101010101" pitchFamily="50" charset="-127"/>
+                        <a:cs typeface="+mn-cs"/>
+                      </a:endParaRPr>
+                    </a:p>
+                  </a:txBody>
+                  <a:tcPr anchor="ctr">
+                    <a:lnL w="12700" cap="flat" cmpd="sng" algn="ctr">
+                      <a:solidFill>
+                        <a:schemeClr val="tx1"/>
+                      </a:solidFill>
+                      <a:prstDash val="solid"/>
+                      <a:round/>
+                      <a:headEnd type="none" w="med" len="med"/>
+                      <a:tailEnd type="none" w="med" len="med"/>
+                    </a:lnL>
+                    <a:lnR w="12700" cap="flat" cmpd="sng" algn="ctr">
+                      <a:solidFill>
+                        <a:schemeClr val="tx1"/>
+                      </a:solidFill>
+                      <a:prstDash val="solid"/>
+                      <a:round/>
+                      <a:headEnd type="none" w="med" len="med"/>
+                      <a:tailEnd type="none" w="med" len="med"/>
+                    </a:lnR>
+                    <a:lnT w="12700" cap="flat" cmpd="sng" algn="ctr">
+                      <a:solidFill>
+                        <a:schemeClr val="tx1"/>
+                      </a:solidFill>
+                      <a:prstDash val="solid"/>
+                      <a:round/>
+                      <a:headEnd type="none" w="med" len="med"/>
+                      <a:tailEnd type="none" w="med" len="med"/>
+                    </a:lnT>
+                    <a:lnB w="12700" cap="flat" cmpd="sng" algn="ctr">
+                      <a:solidFill>
+                        <a:schemeClr val="tx1"/>
+                      </a:solidFill>
+                      <a:prstDash val="solid"/>
+                      <a:round/>
+                      <a:headEnd type="none" w="med" len="med"/>
+                      <a:tailEnd type="none" w="med" len="med"/>
+                    </a:lnB>
+                    <a:solidFill>
+                      <a:schemeClr val="bg1"/>
+                    </a:solidFill>
+                  </a:tcPr>
+                </a:tc>
+                <a:tc>
+                  <a:txBody>
+                    <a:bodyPr/>
+                    <a:lstStyle/>
+                    <a:p>
+                      <a:pPr algn="ctr" latinLnBrk="1"/>
+                      <a:r>
+                        <a:rPr lang="en-US" altLang="ko-KR" sz="900" kern="1200" dirty="0">
+                          <a:solidFill>
+                            <a:schemeClr val="tx1"/>
+                          </a:solidFill>
+                          <a:latin typeface="나눔스퀘어_ac" panose="020B0600000101010101" pitchFamily="50" charset="-127"/>
+                          <a:ea typeface="나눔스퀘어_ac" panose="020B0600000101010101" pitchFamily="50" charset="-127"/>
+                          <a:cs typeface="+mn-cs"/>
+                        </a:rPr>
+                        <a:t>NUMBER(5)</a:t>
+                      </a:r>
+                      <a:endParaRPr lang="ko-KR" altLang="en-US" sz="900" kern="1200" dirty="0">
+                        <a:solidFill>
+                          <a:schemeClr val="tx1"/>
+                        </a:solidFill>
+                        <a:latin typeface="나눔스퀘어_ac" panose="020B0600000101010101" pitchFamily="50" charset="-127"/>
+                        <a:ea typeface="나눔스퀘어_ac" panose="020B0600000101010101" pitchFamily="50" charset="-127"/>
+                        <a:cs typeface="+mn-cs"/>
+                      </a:endParaRPr>
+                    </a:p>
+                  </a:txBody>
+                  <a:tcPr anchor="ctr">
+                    <a:lnL w="12700" cap="flat" cmpd="sng" algn="ctr">
+                      <a:solidFill>
+                        <a:schemeClr val="tx1"/>
+                      </a:solidFill>
+                      <a:prstDash val="solid"/>
+                      <a:round/>
+                      <a:headEnd type="none" w="med" len="med"/>
+                      <a:tailEnd type="none" w="med" len="med"/>
+                    </a:lnL>
+                    <a:lnR w="12700" cap="flat" cmpd="sng" algn="ctr">
+                      <a:solidFill>
+                        <a:schemeClr val="tx1"/>
+                      </a:solidFill>
+                      <a:prstDash val="solid"/>
+                      <a:round/>
+                      <a:headEnd type="none" w="med" len="med"/>
+                      <a:tailEnd type="none" w="med" len="med"/>
+                    </a:lnR>
+                    <a:lnT w="12700" cap="flat" cmpd="sng" algn="ctr">
+                      <a:solidFill>
+                        <a:schemeClr val="tx1"/>
+                      </a:solidFill>
+                      <a:prstDash val="solid"/>
+                      <a:round/>
+                      <a:headEnd type="none" w="med" len="med"/>
+                      <a:tailEnd type="none" w="med" len="med"/>
+                    </a:lnT>
+                    <a:lnB w="12700" cap="flat" cmpd="sng" algn="ctr">
+                      <a:solidFill>
+                        <a:schemeClr val="tx1"/>
+                      </a:solidFill>
+                      <a:prstDash val="solid"/>
+                      <a:round/>
+                      <a:headEnd type="none" w="med" len="med"/>
+                      <a:tailEnd type="none" w="med" len="med"/>
+                    </a:lnB>
+                    <a:solidFill>
+                      <a:schemeClr val="bg1"/>
+                    </a:solidFill>
+                  </a:tcPr>
+                </a:tc>
+                <a:extLst>
+                  <a:ext uri="{0D108BD9-81ED-4DB2-BD59-A6C34878D82A}">
+                    <a16:rowId xmlns:a16="http://schemas.microsoft.com/office/drawing/2014/main" val="3174202032"/>
+                  </a:ext>
+                </a:extLst>
+              </a:tr>
+              <a:tr h="204124">
+                <a:tc>
+                  <a:txBody>
+                    <a:bodyPr/>
+                    <a:lstStyle/>
+                    <a:p>
+                      <a:pPr marL="0" algn="ctr" defTabSz="914400" rtl="0" eaLnBrk="1" latinLnBrk="1" hangingPunct="1"/>
+                      <a:r>
+                        <a:rPr lang="en-US" altLang="ko-KR" sz="900" u="none" kern="1200" dirty="0">
+                          <a:solidFill>
+                            <a:schemeClr val="tx1"/>
+                          </a:solidFill>
+                          <a:latin typeface="나눔스퀘어_ac" panose="020B0600000101010101" pitchFamily="50" charset="-127"/>
+                          <a:ea typeface="나눔스퀘어_ac" panose="020B0600000101010101" pitchFamily="50" charset="-127"/>
+                          <a:cs typeface="+mn-cs"/>
+                        </a:rPr>
+                        <a:t>LOCATION_NAME</a:t>
+                      </a:r>
+                    </a:p>
+                  </a:txBody>
+                  <a:tcPr anchor="ctr">
+                    <a:lnL w="12700" cap="flat" cmpd="sng" algn="ctr">
+                      <a:solidFill>
+                        <a:schemeClr val="tx1"/>
+                      </a:solidFill>
+                      <a:prstDash val="solid"/>
+                      <a:round/>
+                      <a:headEnd type="none" w="med" len="med"/>
+                      <a:tailEnd type="none" w="med" len="med"/>
+                    </a:lnL>
+                    <a:lnR w="12700" cap="flat" cmpd="sng" algn="ctr">
+                      <a:solidFill>
+                        <a:schemeClr val="tx1"/>
+                      </a:solidFill>
+                      <a:prstDash val="solid"/>
+                      <a:round/>
+                      <a:headEnd type="none" w="med" len="med"/>
+                      <a:tailEnd type="none" w="med" len="med"/>
+                    </a:lnR>
+                    <a:lnT w="12700" cap="flat" cmpd="sng" algn="ctr">
+                      <a:solidFill>
+                        <a:schemeClr val="tx1"/>
+                      </a:solidFill>
+                      <a:prstDash val="solid"/>
+                      <a:round/>
+                      <a:headEnd type="none" w="med" len="med"/>
+                      <a:tailEnd type="none" w="med" len="med"/>
+                    </a:lnT>
+                    <a:lnB w="12700" cap="flat" cmpd="sng" algn="ctr">
+                      <a:solidFill>
+                        <a:schemeClr val="tx1"/>
+                      </a:solidFill>
+                      <a:prstDash val="solid"/>
+                      <a:round/>
+                      <a:headEnd type="none" w="med" len="med"/>
+                      <a:tailEnd type="none" w="med" len="med"/>
+                    </a:lnB>
+                    <a:solidFill>
+                      <a:schemeClr val="bg1"/>
+                    </a:solidFill>
+                  </a:tcPr>
+                </a:tc>
+                <a:tc>
+                  <a:txBody>
+                    <a:bodyPr/>
+                    <a:lstStyle/>
+                    <a:p>
+                      <a:pPr marL="0" marR="0" lvl="0" indent="0" algn="ctr" defTabSz="685800" rtl="0" eaLnBrk="1" fontAlgn="auto" latinLnBrk="1" hangingPunct="1">
+                        <a:lnSpc>
+                          <a:spcPct val="100000"/>
+                        </a:lnSpc>
+                        <a:spcBef>
+                          <a:spcPts val="0"/>
+                        </a:spcBef>
+                        <a:spcAft>
+                          <a:spcPts val="0"/>
+                        </a:spcAft>
+                        <a:buClrTx/>
+                        <a:buSzTx/>
+                        <a:buFontTx/>
+                        <a:buNone/>
+                        <a:tabLst/>
+                        <a:defRPr/>
+                      </a:pPr>
+                      <a:r>
+                        <a:rPr lang="en-US" altLang="ko-KR" sz="900" kern="1200" dirty="0">
+                          <a:solidFill>
+                            <a:schemeClr val="tx1"/>
+                          </a:solidFill>
+                          <a:latin typeface="나눔스퀘어_ac" panose="020B0600000101010101" pitchFamily="50" charset="-127"/>
+                          <a:ea typeface="나눔스퀘어_ac" panose="020B0600000101010101" pitchFamily="50" charset="-127"/>
+                          <a:cs typeface="+mn-cs"/>
+                        </a:rPr>
+                        <a:t>NOT NULL</a:t>
+                      </a:r>
+                      <a:endParaRPr lang="ko-KR" altLang="en-US" sz="900" kern="1200" dirty="0">
+                        <a:solidFill>
+                          <a:schemeClr val="tx1"/>
+                        </a:solidFill>
+                        <a:latin typeface="나눔스퀘어_ac" panose="020B0600000101010101" pitchFamily="50" charset="-127"/>
+                        <a:ea typeface="나눔스퀘어_ac" panose="020B0600000101010101" pitchFamily="50" charset="-127"/>
+                        <a:cs typeface="+mn-cs"/>
+                      </a:endParaRPr>
+                    </a:p>
+                  </a:txBody>
+                  <a:tcPr anchor="ctr">
+                    <a:lnL w="12700" cap="flat" cmpd="sng" algn="ctr">
+                      <a:solidFill>
+                        <a:schemeClr val="tx1"/>
+                      </a:solidFill>
+                      <a:prstDash val="solid"/>
+                      <a:round/>
+                      <a:headEnd type="none" w="med" len="med"/>
+                      <a:tailEnd type="none" w="med" len="med"/>
+                    </a:lnL>
+                    <a:lnR w="12700" cap="flat" cmpd="sng" algn="ctr">
+                      <a:solidFill>
+                        <a:schemeClr val="tx1"/>
+                      </a:solidFill>
+                      <a:prstDash val="solid"/>
+                      <a:round/>
+                      <a:headEnd type="none" w="med" len="med"/>
+                      <a:tailEnd type="none" w="med" len="med"/>
+                    </a:lnR>
+                    <a:lnT w="12700" cap="flat" cmpd="sng" algn="ctr">
+                      <a:solidFill>
+                        <a:schemeClr val="tx1"/>
+                      </a:solidFill>
+                      <a:prstDash val="solid"/>
+                      <a:round/>
+                      <a:headEnd type="none" w="med" len="med"/>
+                      <a:tailEnd type="none" w="med" len="med"/>
+                    </a:lnT>
+                    <a:lnB w="12700" cap="flat" cmpd="sng" algn="ctr">
+                      <a:solidFill>
+                        <a:schemeClr val="tx1"/>
+                      </a:solidFill>
+                      <a:prstDash val="solid"/>
+                      <a:round/>
+                      <a:headEnd type="none" w="med" len="med"/>
+                      <a:tailEnd type="none" w="med" len="med"/>
+                    </a:lnB>
+                    <a:solidFill>
+                      <a:schemeClr val="bg1"/>
+                    </a:solidFill>
+                  </a:tcPr>
+                </a:tc>
+                <a:tc>
+                  <a:txBody>
+                    <a:bodyPr/>
+                    <a:lstStyle/>
+                    <a:p>
+                      <a:pPr marL="0" marR="0" lvl="0" indent="0" algn="ctr" defTabSz="685800" rtl="0" eaLnBrk="1" fontAlgn="auto" latinLnBrk="1" hangingPunct="1">
+                        <a:lnSpc>
+                          <a:spcPct val="100000"/>
+                        </a:lnSpc>
+                        <a:spcBef>
+                          <a:spcPts val="0"/>
+                        </a:spcBef>
+                        <a:spcAft>
+                          <a:spcPts val="0"/>
+                        </a:spcAft>
+                        <a:buClrTx/>
+                        <a:buSzTx/>
+                        <a:buFontTx/>
+                        <a:buNone/>
+                        <a:tabLst/>
+                        <a:defRPr/>
+                      </a:pPr>
+                      <a:r>
+                        <a:rPr lang="en-US" altLang="ko-KR" sz="900" kern="1200" dirty="0">
+                          <a:solidFill>
+                            <a:schemeClr val="tx1"/>
+                          </a:solidFill>
+                          <a:latin typeface="나눔스퀘어_ac" panose="020B0600000101010101" pitchFamily="50" charset="-127"/>
+                          <a:ea typeface="나눔스퀘어_ac" panose="020B0600000101010101" pitchFamily="50" charset="-127"/>
+                          <a:cs typeface="+mn-cs"/>
+                        </a:rPr>
+                        <a:t>VARCHAR2(50)</a:t>
+                      </a:r>
+                      <a:endParaRPr lang="ko-KR" altLang="en-US" sz="900" kern="1200" dirty="0">
+                        <a:solidFill>
+                          <a:schemeClr val="tx1"/>
+                        </a:solidFill>
+                        <a:latin typeface="나눔스퀘어_ac" panose="020B0600000101010101" pitchFamily="50" charset="-127"/>
+                        <a:ea typeface="나눔스퀘어_ac" panose="020B0600000101010101" pitchFamily="50" charset="-127"/>
+                        <a:cs typeface="+mn-cs"/>
+                      </a:endParaRPr>
+                    </a:p>
+                  </a:txBody>
+                  <a:tcPr anchor="ctr">
+                    <a:lnL w="12700" cap="flat" cmpd="sng" algn="ctr">
+                      <a:solidFill>
+                        <a:schemeClr val="tx1"/>
+                      </a:solidFill>
+                      <a:prstDash val="solid"/>
+                      <a:round/>
+                      <a:headEnd type="none" w="med" len="med"/>
+                      <a:tailEnd type="none" w="med" len="med"/>
+                    </a:lnL>
+                    <a:lnR w="12700" cap="flat" cmpd="sng" algn="ctr">
+                      <a:solidFill>
+                        <a:schemeClr val="tx1"/>
+                      </a:solidFill>
+                      <a:prstDash val="solid"/>
+                      <a:round/>
+                      <a:headEnd type="none" w="med" len="med"/>
+                      <a:tailEnd type="none" w="med" len="med"/>
+                    </a:lnR>
+                    <a:lnT w="12700" cap="flat" cmpd="sng" algn="ctr">
+                      <a:solidFill>
+                        <a:schemeClr val="tx1"/>
+                      </a:solidFill>
+                      <a:prstDash val="solid"/>
+                      <a:round/>
+                      <a:headEnd type="none" w="med" len="med"/>
+                      <a:tailEnd type="none" w="med" len="med"/>
+                    </a:lnT>
+                    <a:lnB w="12700" cap="flat" cmpd="sng" algn="ctr">
+                      <a:solidFill>
+                        <a:schemeClr val="tx1"/>
+                      </a:solidFill>
+                      <a:prstDash val="solid"/>
+                      <a:round/>
+                      <a:headEnd type="none" w="med" len="med"/>
+                      <a:tailEnd type="none" w="med" len="med"/>
+                    </a:lnB>
+                    <a:solidFill>
+                      <a:schemeClr val="bg1"/>
+                    </a:solidFill>
+                  </a:tcPr>
+                </a:tc>
+                <a:extLst>
+                  <a:ext uri="{0D108BD9-81ED-4DB2-BD59-A6C34878D82A}">
+                    <a16:rowId xmlns:a16="http://schemas.microsoft.com/office/drawing/2014/main" val="1119326414"/>
+                  </a:ext>
+                </a:extLst>
+              </a:tr>
+              <a:tr h="204124">
+                <a:tc>
+                  <a:txBody>
+                    <a:bodyPr/>
+                    <a:lstStyle/>
+                    <a:p>
+                      <a:pPr marL="0" algn="ctr" defTabSz="914400" rtl="0" eaLnBrk="1" latinLnBrk="1" hangingPunct="1"/>
+                      <a:r>
+                        <a:rPr lang="en-US" altLang="ko-KR" sz="900" u="none" kern="1200" dirty="0">
+                          <a:solidFill>
+                            <a:schemeClr val="tx1"/>
+                          </a:solidFill>
+                          <a:latin typeface="나눔스퀘어_ac" panose="020B0600000101010101" pitchFamily="50" charset="-127"/>
+                          <a:ea typeface="나눔스퀘어_ac" panose="020B0600000101010101" pitchFamily="50" charset="-127"/>
+                          <a:cs typeface="+mn-cs"/>
+                        </a:rPr>
+                        <a:t>RESTAURANT_NAME</a:t>
+                      </a:r>
+                    </a:p>
+                  </a:txBody>
+                  <a:tcPr anchor="ctr">
+                    <a:lnL w="12700" cap="flat" cmpd="sng" algn="ctr">
+                      <a:solidFill>
+                        <a:schemeClr val="tx1"/>
+                      </a:solidFill>
+                      <a:prstDash val="solid"/>
+                      <a:round/>
+                      <a:headEnd type="none" w="med" len="med"/>
+                      <a:tailEnd type="none" w="med" len="med"/>
+                    </a:lnL>
+                    <a:lnR w="12700" cap="flat" cmpd="sng" algn="ctr">
+                      <a:solidFill>
+                        <a:schemeClr val="tx1"/>
+                      </a:solidFill>
+                      <a:prstDash val="solid"/>
+                      <a:round/>
+                      <a:headEnd type="none" w="med" len="med"/>
+                      <a:tailEnd type="none" w="med" len="med"/>
+                    </a:lnR>
+                    <a:lnT w="12700" cap="flat" cmpd="sng" algn="ctr">
+                      <a:solidFill>
+                        <a:schemeClr val="tx1"/>
+                      </a:solidFill>
+                      <a:prstDash val="solid"/>
+                      <a:round/>
+                      <a:headEnd type="none" w="med" len="med"/>
+                      <a:tailEnd type="none" w="med" len="med"/>
+                    </a:lnT>
+                    <a:lnB w="12700" cap="flat" cmpd="sng" algn="ctr">
+                      <a:solidFill>
+                        <a:schemeClr val="tx1"/>
+                      </a:solidFill>
+                      <a:prstDash val="solid"/>
+                      <a:round/>
+                      <a:headEnd type="none" w="med" len="med"/>
+                      <a:tailEnd type="none" w="med" len="med"/>
+                    </a:lnB>
+                    <a:solidFill>
+                      <a:schemeClr val="bg1"/>
+                    </a:solidFill>
+                  </a:tcPr>
+                </a:tc>
+                <a:tc>
+                  <a:txBody>
+                    <a:bodyPr/>
+                    <a:lstStyle/>
+                    <a:p>
+                      <a:pPr marL="0" marR="0" lvl="0" indent="0" algn="ctr" defTabSz="685800" rtl="0" eaLnBrk="1" fontAlgn="auto" latinLnBrk="1" hangingPunct="1">
+                        <a:lnSpc>
+                          <a:spcPct val="100000"/>
+                        </a:lnSpc>
+                        <a:spcBef>
+                          <a:spcPts val="0"/>
+                        </a:spcBef>
+                        <a:spcAft>
+                          <a:spcPts val="0"/>
+                        </a:spcAft>
+                        <a:buClrTx/>
+                        <a:buSzTx/>
+                        <a:buFontTx/>
+                        <a:buNone/>
+                        <a:tabLst/>
+                        <a:defRPr/>
+                      </a:pPr>
+                      <a:endParaRPr lang="ko-KR" altLang="en-US" sz="900" kern="1200" dirty="0">
+                        <a:solidFill>
+                          <a:schemeClr val="tx1"/>
+                        </a:solidFill>
+                        <a:latin typeface="나눔스퀘어_ac" panose="020B0600000101010101" pitchFamily="50" charset="-127"/>
+                        <a:ea typeface="나눔스퀘어_ac" panose="020B0600000101010101" pitchFamily="50" charset="-127"/>
+                        <a:cs typeface="+mn-cs"/>
+                      </a:endParaRPr>
+                    </a:p>
+                  </a:txBody>
+                  <a:tcPr anchor="ctr">
+                    <a:lnL w="12700" cap="flat" cmpd="sng" algn="ctr">
+                      <a:solidFill>
+                        <a:schemeClr val="tx1"/>
+                      </a:solidFill>
+                      <a:prstDash val="solid"/>
+                      <a:round/>
+                      <a:headEnd type="none" w="med" len="med"/>
+                      <a:tailEnd type="none" w="med" len="med"/>
+                    </a:lnL>
+                    <a:lnR w="12700" cap="flat" cmpd="sng" algn="ctr">
+                      <a:solidFill>
+                        <a:schemeClr val="tx1"/>
+                      </a:solidFill>
+                      <a:prstDash val="solid"/>
+                      <a:round/>
+                      <a:headEnd type="none" w="med" len="med"/>
+                      <a:tailEnd type="none" w="med" len="med"/>
+                    </a:lnR>
+                    <a:lnT w="12700" cap="flat" cmpd="sng" algn="ctr">
+                      <a:solidFill>
+                        <a:schemeClr val="tx1"/>
+                      </a:solidFill>
+                      <a:prstDash val="solid"/>
+                      <a:round/>
+                      <a:headEnd type="none" w="med" len="med"/>
+                      <a:tailEnd type="none" w="med" len="med"/>
+                    </a:lnT>
+                    <a:lnB w="12700" cap="flat" cmpd="sng" algn="ctr">
+                      <a:solidFill>
+                        <a:schemeClr val="tx1"/>
+                      </a:solidFill>
+                      <a:prstDash val="solid"/>
+                      <a:round/>
+                      <a:headEnd type="none" w="med" len="med"/>
+                      <a:tailEnd type="none" w="med" len="med"/>
+                    </a:lnB>
+                    <a:solidFill>
+                      <a:schemeClr val="bg1"/>
+                    </a:solidFill>
+                  </a:tcPr>
+                </a:tc>
+                <a:tc>
+                  <a:txBody>
+                    <a:bodyPr/>
+                    <a:lstStyle/>
+                    <a:p>
+                      <a:pPr marL="0" marR="0" lvl="0" indent="0" algn="ctr" defTabSz="685800" rtl="0" eaLnBrk="1" fontAlgn="auto" latinLnBrk="1" hangingPunct="1">
+                        <a:lnSpc>
+                          <a:spcPct val="100000"/>
+                        </a:lnSpc>
+                        <a:spcBef>
+                          <a:spcPts val="0"/>
+                        </a:spcBef>
+                        <a:spcAft>
+                          <a:spcPts val="0"/>
+                        </a:spcAft>
+                        <a:buClrTx/>
+                        <a:buSzTx/>
+                        <a:buFontTx/>
+                        <a:buNone/>
+                        <a:tabLst/>
+                        <a:defRPr/>
+                      </a:pPr>
+                      <a:r>
+                        <a:rPr lang="en-US" altLang="ko-KR" sz="900" kern="1200" dirty="0">
+                          <a:solidFill>
+                            <a:schemeClr val="tx1"/>
+                          </a:solidFill>
+                          <a:latin typeface="나눔스퀘어_ac" panose="020B0600000101010101" pitchFamily="50" charset="-127"/>
+                          <a:ea typeface="나눔스퀘어_ac" panose="020B0600000101010101" pitchFamily="50" charset="-127"/>
+                          <a:cs typeface="+mn-cs"/>
+                        </a:rPr>
+                        <a:t>VARCHAR2(100)</a:t>
+                      </a:r>
+                      <a:endParaRPr lang="ko-KR" altLang="en-US" sz="900" kern="1200" dirty="0">
+                        <a:solidFill>
+                          <a:schemeClr val="tx1"/>
+                        </a:solidFill>
+                        <a:latin typeface="나눔스퀘어_ac" panose="020B0600000101010101" pitchFamily="50" charset="-127"/>
+                        <a:ea typeface="나눔스퀘어_ac" panose="020B0600000101010101" pitchFamily="50" charset="-127"/>
+                        <a:cs typeface="+mn-cs"/>
+                      </a:endParaRPr>
+                    </a:p>
+                  </a:txBody>
+                  <a:tcPr anchor="ctr">
+                    <a:lnL w="12700" cap="flat" cmpd="sng" algn="ctr">
+                      <a:solidFill>
+                        <a:schemeClr val="tx1"/>
+                      </a:solidFill>
+                      <a:prstDash val="solid"/>
+                      <a:round/>
+                      <a:headEnd type="none" w="med" len="med"/>
+                      <a:tailEnd type="none" w="med" len="med"/>
+                    </a:lnL>
+                    <a:lnR w="12700" cap="flat" cmpd="sng" algn="ctr">
+                      <a:solidFill>
+                        <a:schemeClr val="tx1"/>
+                      </a:solidFill>
+                      <a:prstDash val="solid"/>
+                      <a:round/>
+                      <a:headEnd type="none" w="med" len="med"/>
+                      <a:tailEnd type="none" w="med" len="med"/>
+                    </a:lnR>
+                    <a:lnT w="12700" cap="flat" cmpd="sng" algn="ctr">
+                      <a:solidFill>
+                        <a:schemeClr val="tx1"/>
+                      </a:solidFill>
+                      <a:prstDash val="solid"/>
+                      <a:round/>
+                      <a:headEnd type="none" w="med" len="med"/>
+                      <a:tailEnd type="none" w="med" len="med"/>
+                    </a:lnT>
+                    <a:lnB w="12700" cap="flat" cmpd="sng" algn="ctr">
+                      <a:solidFill>
+                        <a:schemeClr val="tx1"/>
+                      </a:solidFill>
+                      <a:prstDash val="solid"/>
+                      <a:round/>
+                      <a:headEnd type="none" w="med" len="med"/>
+                      <a:tailEnd type="none" w="med" len="med"/>
+                    </a:lnB>
+                    <a:solidFill>
+                      <a:schemeClr val="bg1"/>
+                    </a:solidFill>
+                  </a:tcPr>
+                </a:tc>
+                <a:extLst>
+                  <a:ext uri="{0D108BD9-81ED-4DB2-BD59-A6C34878D82A}">
+                    <a16:rowId xmlns:a16="http://schemas.microsoft.com/office/drawing/2014/main" val="69797215"/>
+                  </a:ext>
+                </a:extLst>
+              </a:tr>
+              <a:tr h="204124">
+                <a:tc>
+                  <a:txBody>
+                    <a:bodyPr/>
+                    <a:lstStyle/>
+                    <a:p>
+                      <a:pPr marL="0" algn="ctr" defTabSz="914400" rtl="0" eaLnBrk="1" latinLnBrk="1" hangingPunct="1"/>
+                      <a:r>
+                        <a:rPr lang="en-US" altLang="ko-KR" sz="900" u="none" kern="1200" dirty="0">
+                          <a:solidFill>
+                            <a:schemeClr val="tx1"/>
+                          </a:solidFill>
+                          <a:latin typeface="나눔스퀘어_ac" panose="020B0600000101010101" pitchFamily="50" charset="-127"/>
+                          <a:ea typeface="나눔스퀘어_ac" panose="020B0600000101010101" pitchFamily="50" charset="-127"/>
+                          <a:cs typeface="+mn-cs"/>
+                        </a:rPr>
+                        <a:t>CATEGORY</a:t>
+                      </a:r>
+                    </a:p>
+                  </a:txBody>
+                  <a:tcPr anchor="ctr">
+                    <a:lnL w="12700" cap="flat" cmpd="sng" algn="ctr">
+                      <a:solidFill>
+                        <a:schemeClr val="tx1"/>
+                      </a:solidFill>
+                      <a:prstDash val="solid"/>
+                      <a:round/>
+                      <a:headEnd type="none" w="med" len="med"/>
+                      <a:tailEnd type="none" w="med" len="med"/>
+                    </a:lnL>
+                    <a:lnR w="12700" cap="flat" cmpd="sng" algn="ctr">
+                      <a:solidFill>
+                        <a:schemeClr val="tx1"/>
+                      </a:solidFill>
+                      <a:prstDash val="solid"/>
+                      <a:round/>
+                      <a:headEnd type="none" w="med" len="med"/>
+                      <a:tailEnd type="none" w="med" len="med"/>
+                    </a:lnR>
+                    <a:lnT w="12700" cap="flat" cmpd="sng" algn="ctr">
+                      <a:solidFill>
+                        <a:schemeClr val="tx1"/>
+                      </a:solidFill>
+                      <a:prstDash val="solid"/>
+                      <a:round/>
+                      <a:headEnd type="none" w="med" len="med"/>
+                      <a:tailEnd type="none" w="med" len="med"/>
+                    </a:lnT>
+                    <a:lnB w="12700" cap="flat" cmpd="sng" algn="ctr">
+                      <a:solidFill>
+                        <a:schemeClr val="tx1"/>
+                      </a:solidFill>
+                      <a:prstDash val="solid"/>
+                      <a:round/>
+                      <a:headEnd type="none" w="med" len="med"/>
+                      <a:tailEnd type="none" w="med" len="med"/>
+                    </a:lnB>
+                    <a:solidFill>
+                      <a:schemeClr val="bg1"/>
+                    </a:solidFill>
+                  </a:tcPr>
+                </a:tc>
+                <a:tc>
+                  <a:txBody>
+                    <a:bodyPr/>
+                    <a:lstStyle/>
+                    <a:p>
+                      <a:pPr marL="0" marR="0" lvl="0" indent="0" algn="ctr" defTabSz="685800" rtl="0" eaLnBrk="1" fontAlgn="auto" latinLnBrk="1" hangingPunct="1">
+                        <a:lnSpc>
+                          <a:spcPct val="100000"/>
+                        </a:lnSpc>
+                        <a:spcBef>
+                          <a:spcPts val="0"/>
+                        </a:spcBef>
+                        <a:spcAft>
+                          <a:spcPts val="0"/>
+                        </a:spcAft>
+                        <a:buClrTx/>
+                        <a:buSzTx/>
+                        <a:buFontTx/>
+                        <a:buNone/>
+                        <a:tabLst/>
+                        <a:defRPr/>
+                      </a:pPr>
+                      <a:endParaRPr lang="ko-KR" altLang="en-US" sz="900" kern="1200" dirty="0">
+                        <a:solidFill>
+                          <a:schemeClr val="tx1"/>
+                        </a:solidFill>
+                        <a:latin typeface="나눔스퀘어_ac" panose="020B0600000101010101" pitchFamily="50" charset="-127"/>
+                        <a:ea typeface="나눔스퀘어_ac" panose="020B0600000101010101" pitchFamily="50" charset="-127"/>
+                        <a:cs typeface="+mn-cs"/>
+                      </a:endParaRPr>
+                    </a:p>
+                  </a:txBody>
+                  <a:tcPr anchor="ctr">
+                    <a:lnL w="12700" cap="flat" cmpd="sng" algn="ctr">
+                      <a:solidFill>
+                        <a:schemeClr val="tx1"/>
+                      </a:solidFill>
+                      <a:prstDash val="solid"/>
+                      <a:round/>
+                      <a:headEnd type="none" w="med" len="med"/>
+                      <a:tailEnd type="none" w="med" len="med"/>
+                    </a:lnL>
+                    <a:lnR w="12700" cap="flat" cmpd="sng" algn="ctr">
+                      <a:solidFill>
+                        <a:schemeClr val="tx1"/>
+                      </a:solidFill>
+                      <a:prstDash val="solid"/>
+                      <a:round/>
+                      <a:headEnd type="none" w="med" len="med"/>
+                      <a:tailEnd type="none" w="med" len="med"/>
+                    </a:lnR>
+                    <a:lnT w="12700" cap="flat" cmpd="sng" algn="ctr">
+                      <a:solidFill>
+                        <a:schemeClr val="tx1"/>
+                      </a:solidFill>
+                      <a:prstDash val="solid"/>
+                      <a:round/>
+                      <a:headEnd type="none" w="med" len="med"/>
+                      <a:tailEnd type="none" w="med" len="med"/>
+                    </a:lnT>
+                    <a:lnB w="12700" cap="flat" cmpd="sng" algn="ctr">
+                      <a:solidFill>
+                        <a:schemeClr val="tx1"/>
+                      </a:solidFill>
+                      <a:prstDash val="solid"/>
+                      <a:round/>
+                      <a:headEnd type="none" w="med" len="med"/>
+                      <a:tailEnd type="none" w="med" len="med"/>
+                    </a:lnB>
+                    <a:solidFill>
+                      <a:schemeClr val="bg1"/>
+                    </a:solidFill>
+                  </a:tcPr>
+                </a:tc>
+                <a:tc>
+                  <a:txBody>
+                    <a:bodyPr/>
+                    <a:lstStyle/>
+                    <a:p>
+                      <a:pPr marL="0" marR="0" lvl="0" indent="0" algn="ctr" defTabSz="685800" rtl="0" eaLnBrk="1" fontAlgn="auto" latinLnBrk="1" hangingPunct="1">
+                        <a:lnSpc>
+                          <a:spcPct val="100000"/>
+                        </a:lnSpc>
+                        <a:spcBef>
+                          <a:spcPts val="0"/>
+                        </a:spcBef>
+                        <a:spcAft>
+                          <a:spcPts val="0"/>
+                        </a:spcAft>
+                        <a:buClrTx/>
+                        <a:buSzTx/>
+                        <a:buFontTx/>
+                        <a:buNone/>
+                        <a:tabLst/>
+                        <a:defRPr/>
+                      </a:pPr>
+                      <a:r>
+                        <a:rPr lang="en-US" altLang="ko-KR" sz="900" kern="1200" dirty="0">
+                          <a:solidFill>
+                            <a:schemeClr val="tx1"/>
+                          </a:solidFill>
+                          <a:latin typeface="나눔스퀘어_ac" panose="020B0600000101010101" pitchFamily="50" charset="-127"/>
+                          <a:ea typeface="나눔스퀘어_ac" panose="020B0600000101010101" pitchFamily="50" charset="-127"/>
+                          <a:cs typeface="+mn-cs"/>
+                        </a:rPr>
+                        <a:t>VARCHAR2(100)</a:t>
+                      </a:r>
+                      <a:endParaRPr lang="ko-KR" altLang="en-US" sz="900" kern="1200" dirty="0">
+                        <a:solidFill>
+                          <a:schemeClr val="tx1"/>
+                        </a:solidFill>
+                        <a:latin typeface="나눔스퀘어_ac" panose="020B0600000101010101" pitchFamily="50" charset="-127"/>
+                        <a:ea typeface="나눔스퀘어_ac" panose="020B0600000101010101" pitchFamily="50" charset="-127"/>
+                        <a:cs typeface="+mn-cs"/>
+                      </a:endParaRPr>
+                    </a:p>
+                  </a:txBody>
+                  <a:tcPr anchor="ctr">
+                    <a:lnL w="12700" cap="flat" cmpd="sng" algn="ctr">
+                      <a:solidFill>
+                        <a:schemeClr val="tx1"/>
+                      </a:solidFill>
+                      <a:prstDash val="solid"/>
+                      <a:round/>
+                      <a:headEnd type="none" w="med" len="med"/>
+                      <a:tailEnd type="none" w="med" len="med"/>
+                    </a:lnL>
+                    <a:lnR w="12700" cap="flat" cmpd="sng" algn="ctr">
+                      <a:solidFill>
+                        <a:schemeClr val="tx1"/>
+                      </a:solidFill>
+                      <a:prstDash val="solid"/>
+                      <a:round/>
+                      <a:headEnd type="none" w="med" len="med"/>
+                      <a:tailEnd type="none" w="med" len="med"/>
+                    </a:lnR>
+                    <a:lnT w="12700" cap="flat" cmpd="sng" algn="ctr">
+                      <a:solidFill>
+                        <a:schemeClr val="tx1"/>
+                      </a:solidFill>
+                      <a:prstDash val="solid"/>
+                      <a:round/>
+                      <a:headEnd type="none" w="med" len="med"/>
+                      <a:tailEnd type="none" w="med" len="med"/>
+                    </a:lnT>
+                    <a:lnB w="12700" cap="flat" cmpd="sng" algn="ctr">
+                      <a:solidFill>
+                        <a:schemeClr val="tx1"/>
+                      </a:solidFill>
+                      <a:prstDash val="solid"/>
+                      <a:round/>
+                      <a:headEnd type="none" w="med" len="med"/>
+                      <a:tailEnd type="none" w="med" len="med"/>
+                    </a:lnB>
+                    <a:solidFill>
+                      <a:schemeClr val="bg1"/>
+                    </a:solidFill>
+                  </a:tcPr>
+                </a:tc>
+                <a:extLst>
+                  <a:ext uri="{0D108BD9-81ED-4DB2-BD59-A6C34878D82A}">
+                    <a16:rowId xmlns:a16="http://schemas.microsoft.com/office/drawing/2014/main" val="519077795"/>
+                  </a:ext>
+                </a:extLst>
+              </a:tr>
+              <a:tr h="204124">
+                <a:tc>
+                  <a:txBody>
+                    <a:bodyPr/>
+                    <a:lstStyle/>
+                    <a:p>
+                      <a:pPr marL="0" algn="ctr" defTabSz="914400" rtl="0" eaLnBrk="1" latinLnBrk="1" hangingPunct="1"/>
+                      <a:r>
+                        <a:rPr lang="en-US" altLang="ko-KR" sz="900" u="none" kern="1200" dirty="0">
+                          <a:solidFill>
+                            <a:schemeClr val="tx1"/>
+                          </a:solidFill>
+                          <a:latin typeface="나눔스퀘어_ac" panose="020B0600000101010101" pitchFamily="50" charset="-127"/>
+                          <a:ea typeface="나눔스퀘어_ac" panose="020B0600000101010101" pitchFamily="50" charset="-127"/>
+                          <a:cs typeface="+mn-cs"/>
+                        </a:rPr>
+                        <a:t>FULL_ADDRESS</a:t>
+                      </a:r>
+                    </a:p>
+                  </a:txBody>
+                  <a:tcPr anchor="ctr">
+                    <a:lnL w="12700" cap="flat" cmpd="sng" algn="ctr">
+                      <a:solidFill>
+                        <a:schemeClr val="tx1"/>
+                      </a:solidFill>
+                      <a:prstDash val="solid"/>
+                      <a:round/>
+                      <a:headEnd type="none" w="med" len="med"/>
+                      <a:tailEnd type="none" w="med" len="med"/>
+                    </a:lnL>
+                    <a:lnR w="12700" cap="flat" cmpd="sng" algn="ctr">
+                      <a:solidFill>
+                        <a:schemeClr val="tx1"/>
+                      </a:solidFill>
+                      <a:prstDash val="solid"/>
+                      <a:round/>
+                      <a:headEnd type="none" w="med" len="med"/>
+                      <a:tailEnd type="none" w="med" len="med"/>
+                    </a:lnR>
+                    <a:lnT w="12700" cap="flat" cmpd="sng" algn="ctr">
+                      <a:solidFill>
+                        <a:schemeClr val="tx1"/>
+                      </a:solidFill>
+                      <a:prstDash val="solid"/>
+                      <a:round/>
+                      <a:headEnd type="none" w="med" len="med"/>
+                      <a:tailEnd type="none" w="med" len="med"/>
+                    </a:lnT>
+                    <a:lnB w="12700" cap="flat" cmpd="sng" algn="ctr">
+                      <a:solidFill>
+                        <a:schemeClr val="tx1"/>
+                      </a:solidFill>
+                      <a:prstDash val="solid"/>
+                      <a:round/>
+                      <a:headEnd type="none" w="med" len="med"/>
+                      <a:tailEnd type="none" w="med" len="med"/>
+                    </a:lnB>
+                    <a:solidFill>
+                      <a:schemeClr val="bg1"/>
+                    </a:solidFill>
+                  </a:tcPr>
+                </a:tc>
+                <a:tc>
+                  <a:txBody>
+                    <a:bodyPr/>
+                    <a:lstStyle/>
+                    <a:p>
+                      <a:pPr marL="0" marR="0" lvl="0" indent="0" algn="ctr" defTabSz="685800" rtl="0" eaLnBrk="1" fontAlgn="auto" latinLnBrk="1" hangingPunct="1">
+                        <a:lnSpc>
+                          <a:spcPct val="100000"/>
+                        </a:lnSpc>
+                        <a:spcBef>
+                          <a:spcPts val="0"/>
+                        </a:spcBef>
+                        <a:spcAft>
+                          <a:spcPts val="0"/>
+                        </a:spcAft>
+                        <a:buClrTx/>
+                        <a:buSzTx/>
+                        <a:buFontTx/>
+                        <a:buNone/>
+                        <a:tabLst/>
+                        <a:defRPr/>
+                      </a:pPr>
+                      <a:endParaRPr lang="ko-KR" altLang="en-US" sz="900" kern="1200" dirty="0">
+                        <a:solidFill>
+                          <a:schemeClr val="tx1"/>
+                        </a:solidFill>
+                        <a:latin typeface="나눔스퀘어_ac" panose="020B0600000101010101" pitchFamily="50" charset="-127"/>
+                        <a:ea typeface="나눔스퀘어_ac" panose="020B0600000101010101" pitchFamily="50" charset="-127"/>
+                        <a:cs typeface="+mn-cs"/>
+                      </a:endParaRPr>
+                    </a:p>
+                  </a:txBody>
+                  <a:tcPr anchor="ctr">
+                    <a:lnL w="12700" cap="flat" cmpd="sng" algn="ctr">
+                      <a:solidFill>
+                        <a:schemeClr val="tx1"/>
+                      </a:solidFill>
+                      <a:prstDash val="solid"/>
+                      <a:round/>
+                      <a:headEnd type="none" w="med" len="med"/>
+                      <a:tailEnd type="none" w="med" len="med"/>
+                    </a:lnL>
+                    <a:lnR w="12700" cap="flat" cmpd="sng" algn="ctr">
+                      <a:solidFill>
+                        <a:schemeClr val="tx1"/>
+                      </a:solidFill>
+                      <a:prstDash val="solid"/>
+                      <a:round/>
+                      <a:headEnd type="none" w="med" len="med"/>
+                      <a:tailEnd type="none" w="med" len="med"/>
+                    </a:lnR>
+                    <a:lnT w="12700" cap="flat" cmpd="sng" algn="ctr">
+                      <a:solidFill>
+                        <a:schemeClr val="tx1"/>
+                      </a:solidFill>
+                      <a:prstDash val="solid"/>
+                      <a:round/>
+                      <a:headEnd type="none" w="med" len="med"/>
+                      <a:tailEnd type="none" w="med" len="med"/>
+                    </a:lnT>
+                    <a:lnB w="12700" cap="flat" cmpd="sng" algn="ctr">
+                      <a:solidFill>
+                        <a:schemeClr val="tx1"/>
+                      </a:solidFill>
+                      <a:prstDash val="solid"/>
+                      <a:round/>
+                      <a:headEnd type="none" w="med" len="med"/>
+                      <a:tailEnd type="none" w="med" len="med"/>
+                    </a:lnB>
+                    <a:solidFill>
+                      <a:schemeClr val="bg1"/>
+                    </a:solidFill>
+                  </a:tcPr>
+                </a:tc>
+                <a:tc>
+                  <a:txBody>
+                    <a:bodyPr/>
+                    <a:lstStyle/>
+                    <a:p>
+                      <a:pPr marL="0" marR="0" lvl="0" indent="0" algn="ctr" defTabSz="685800" rtl="0" eaLnBrk="1" fontAlgn="auto" latinLnBrk="1" hangingPunct="1">
+                        <a:lnSpc>
+                          <a:spcPct val="100000"/>
+                        </a:lnSpc>
+                        <a:spcBef>
+                          <a:spcPts val="0"/>
+                        </a:spcBef>
+                        <a:spcAft>
+                          <a:spcPts val="0"/>
+                        </a:spcAft>
+                        <a:buClrTx/>
+                        <a:buSzTx/>
+                        <a:buFontTx/>
+                        <a:buNone/>
+                        <a:tabLst/>
+                        <a:defRPr/>
+                      </a:pPr>
+                      <a:r>
+                        <a:rPr lang="en-US" altLang="ko-KR" sz="900" kern="1200" dirty="0">
+                          <a:solidFill>
+                            <a:schemeClr val="tx1"/>
+                          </a:solidFill>
+                          <a:latin typeface="나눔스퀘어_ac" panose="020B0600000101010101" pitchFamily="50" charset="-127"/>
+                          <a:ea typeface="나눔스퀘어_ac" panose="020B0600000101010101" pitchFamily="50" charset="-127"/>
+                          <a:cs typeface="+mn-cs"/>
+                        </a:rPr>
+                        <a:t>VARCHAR2(200)</a:t>
+                      </a:r>
+                      <a:endParaRPr lang="ko-KR" altLang="en-US" sz="900" kern="1200" dirty="0">
+                        <a:solidFill>
+                          <a:schemeClr val="tx1"/>
+                        </a:solidFill>
+                        <a:latin typeface="나눔스퀘어_ac" panose="020B0600000101010101" pitchFamily="50" charset="-127"/>
+                        <a:ea typeface="나눔스퀘어_ac" panose="020B0600000101010101" pitchFamily="50" charset="-127"/>
+                        <a:cs typeface="+mn-cs"/>
+                      </a:endParaRPr>
+                    </a:p>
+                  </a:txBody>
+                  <a:tcPr anchor="ctr">
+                    <a:lnL w="12700" cap="flat" cmpd="sng" algn="ctr">
+                      <a:solidFill>
+                        <a:schemeClr val="tx1"/>
+                      </a:solidFill>
+                      <a:prstDash val="solid"/>
+                      <a:round/>
+                      <a:headEnd type="none" w="med" len="med"/>
+                      <a:tailEnd type="none" w="med" len="med"/>
+                    </a:lnL>
+                    <a:lnR w="12700" cap="flat" cmpd="sng" algn="ctr">
+                      <a:solidFill>
+                        <a:schemeClr val="tx1"/>
+                      </a:solidFill>
+                      <a:prstDash val="solid"/>
+                      <a:round/>
+                      <a:headEnd type="none" w="med" len="med"/>
+                      <a:tailEnd type="none" w="med" len="med"/>
+                    </a:lnR>
+                    <a:lnT w="12700" cap="flat" cmpd="sng" algn="ctr">
+                      <a:solidFill>
+                        <a:schemeClr val="tx1"/>
+                      </a:solidFill>
+                      <a:prstDash val="solid"/>
+                      <a:round/>
+                      <a:headEnd type="none" w="med" len="med"/>
+                      <a:tailEnd type="none" w="med" len="med"/>
+                    </a:lnT>
+                    <a:lnB w="12700" cap="flat" cmpd="sng" algn="ctr">
+                      <a:solidFill>
+                        <a:schemeClr val="tx1"/>
+                      </a:solidFill>
+                      <a:prstDash val="solid"/>
+                      <a:round/>
+                      <a:headEnd type="none" w="med" len="med"/>
+                      <a:tailEnd type="none" w="med" len="med"/>
+                    </a:lnB>
+                    <a:solidFill>
+                      <a:schemeClr val="bg1"/>
+                    </a:solidFill>
+                  </a:tcPr>
+                </a:tc>
+                <a:extLst>
+                  <a:ext uri="{0D108BD9-81ED-4DB2-BD59-A6C34878D82A}">
+                    <a16:rowId xmlns:a16="http://schemas.microsoft.com/office/drawing/2014/main" val="1890487877"/>
+                  </a:ext>
+                </a:extLst>
+              </a:tr>
+              <a:tr h="204124">
+                <a:tc>
+                  <a:txBody>
+                    <a:bodyPr/>
+                    <a:lstStyle/>
+                    <a:p>
+                      <a:pPr marL="0" algn="ctr" defTabSz="914400" rtl="0" eaLnBrk="1" latinLnBrk="1" hangingPunct="1"/>
+                      <a:r>
+                        <a:rPr lang="en-US" altLang="ko-KR" sz="900" u="none" kern="1200" dirty="0">
+                          <a:solidFill>
+                            <a:schemeClr val="tx1"/>
+                          </a:solidFill>
+                          <a:latin typeface="나눔스퀘어_ac" panose="020B0600000101010101" pitchFamily="50" charset="-127"/>
+                          <a:ea typeface="나눔스퀘어_ac" panose="020B0600000101010101" pitchFamily="50" charset="-127"/>
+                          <a:cs typeface="+mn-cs"/>
+                        </a:rPr>
+                        <a:t>LAT</a:t>
+                      </a:r>
+                    </a:p>
+                  </a:txBody>
+                  <a:tcPr anchor="ctr">
+                    <a:lnL w="12700" cap="flat" cmpd="sng" algn="ctr">
+                      <a:solidFill>
+                        <a:schemeClr val="tx1"/>
+                      </a:solidFill>
+                      <a:prstDash val="solid"/>
+                      <a:round/>
+                      <a:headEnd type="none" w="med" len="med"/>
+                      <a:tailEnd type="none" w="med" len="med"/>
+                    </a:lnL>
+                    <a:lnR w="12700" cap="flat" cmpd="sng" algn="ctr">
+                      <a:solidFill>
+                        <a:schemeClr val="tx1"/>
+                      </a:solidFill>
+                      <a:prstDash val="solid"/>
+                      <a:round/>
+                      <a:headEnd type="none" w="med" len="med"/>
+                      <a:tailEnd type="none" w="med" len="med"/>
+                    </a:lnR>
+                    <a:lnT w="12700" cap="flat" cmpd="sng" algn="ctr">
+                      <a:solidFill>
+                        <a:schemeClr val="tx1"/>
+                      </a:solidFill>
+                      <a:prstDash val="solid"/>
+                      <a:round/>
+                      <a:headEnd type="none" w="med" len="med"/>
+                      <a:tailEnd type="none" w="med" len="med"/>
+                    </a:lnT>
+                    <a:lnB w="12700" cap="flat" cmpd="sng" algn="ctr">
+                      <a:solidFill>
+                        <a:schemeClr val="tx1"/>
+                      </a:solidFill>
+                      <a:prstDash val="solid"/>
+                      <a:round/>
+                      <a:headEnd type="none" w="med" len="med"/>
+                      <a:tailEnd type="none" w="med" len="med"/>
+                    </a:lnB>
+                    <a:solidFill>
+                      <a:schemeClr val="bg1"/>
+                    </a:solidFill>
+                  </a:tcPr>
+                </a:tc>
+                <a:tc>
+                  <a:txBody>
+                    <a:bodyPr/>
+                    <a:lstStyle/>
+                    <a:p>
+                      <a:pPr marL="0" marR="0" lvl="0" indent="0" algn="ctr" defTabSz="685800" rtl="0" eaLnBrk="1" fontAlgn="auto" latinLnBrk="1" hangingPunct="1">
+                        <a:lnSpc>
+                          <a:spcPct val="100000"/>
+                        </a:lnSpc>
+                        <a:spcBef>
+                          <a:spcPts val="0"/>
+                        </a:spcBef>
+                        <a:spcAft>
+                          <a:spcPts val="0"/>
+                        </a:spcAft>
+                        <a:buClrTx/>
+                        <a:buSzTx/>
+                        <a:buFontTx/>
+                        <a:buNone/>
+                        <a:tabLst/>
+                        <a:defRPr/>
+                      </a:pPr>
+                      <a:endParaRPr lang="ko-KR" altLang="en-US" sz="900" kern="1200" dirty="0">
+                        <a:solidFill>
+                          <a:schemeClr val="tx1"/>
+                        </a:solidFill>
+                        <a:latin typeface="나눔스퀘어_ac" panose="020B0600000101010101" pitchFamily="50" charset="-127"/>
+                        <a:ea typeface="나눔스퀘어_ac" panose="020B0600000101010101" pitchFamily="50" charset="-127"/>
+                        <a:cs typeface="+mn-cs"/>
+                      </a:endParaRPr>
+                    </a:p>
+                  </a:txBody>
+                  <a:tcPr anchor="ctr">
+                    <a:lnL w="12700" cap="flat" cmpd="sng" algn="ctr">
+                      <a:solidFill>
+                        <a:schemeClr val="tx1"/>
+                      </a:solidFill>
+                      <a:prstDash val="solid"/>
+                      <a:round/>
+                      <a:headEnd type="none" w="med" len="med"/>
+                      <a:tailEnd type="none" w="med" len="med"/>
+                    </a:lnL>
+                    <a:lnR w="12700" cap="flat" cmpd="sng" algn="ctr">
+                      <a:solidFill>
+                        <a:schemeClr val="tx1"/>
+                      </a:solidFill>
+                      <a:prstDash val="solid"/>
+                      <a:round/>
+                      <a:headEnd type="none" w="med" len="med"/>
+                      <a:tailEnd type="none" w="med" len="med"/>
+                    </a:lnR>
+                    <a:lnT w="12700" cap="flat" cmpd="sng" algn="ctr">
+                      <a:solidFill>
+                        <a:schemeClr val="tx1"/>
+                      </a:solidFill>
+                      <a:prstDash val="solid"/>
+                      <a:round/>
+                      <a:headEnd type="none" w="med" len="med"/>
+                      <a:tailEnd type="none" w="med" len="med"/>
+                    </a:lnT>
+                    <a:lnB w="12700" cap="flat" cmpd="sng" algn="ctr">
+                      <a:solidFill>
+                        <a:schemeClr val="tx1"/>
+                      </a:solidFill>
+                      <a:prstDash val="solid"/>
+                      <a:round/>
+                      <a:headEnd type="none" w="med" len="med"/>
+                      <a:tailEnd type="none" w="med" len="med"/>
+                    </a:lnB>
+                    <a:solidFill>
+                      <a:schemeClr val="bg1"/>
+                    </a:solidFill>
+                  </a:tcPr>
+                </a:tc>
+                <a:tc>
+                  <a:txBody>
+                    <a:bodyPr/>
+                    <a:lstStyle/>
+                    <a:p>
+                      <a:pPr marL="0" marR="0" lvl="0" indent="0" algn="ctr" defTabSz="685800" rtl="0" eaLnBrk="1" fontAlgn="auto" latinLnBrk="1" hangingPunct="1">
+                        <a:lnSpc>
+                          <a:spcPct val="100000"/>
+                        </a:lnSpc>
+                        <a:spcBef>
+                          <a:spcPts val="0"/>
+                        </a:spcBef>
+                        <a:spcAft>
+                          <a:spcPts val="0"/>
+                        </a:spcAft>
+                        <a:buClrTx/>
+                        <a:buSzTx/>
+                        <a:buFontTx/>
+                        <a:buNone/>
+                        <a:tabLst/>
+                        <a:defRPr/>
+                      </a:pPr>
+                      <a:r>
+                        <a:rPr lang="en-US" altLang="ko-KR" sz="900" kern="1200" dirty="0">
+                          <a:solidFill>
+                            <a:schemeClr val="tx1"/>
+                          </a:solidFill>
+                          <a:latin typeface="나눔스퀘어_ac" panose="020B0600000101010101" pitchFamily="50" charset="-127"/>
+                          <a:ea typeface="나눔스퀘어_ac" panose="020B0600000101010101" pitchFamily="50" charset="-127"/>
+                          <a:cs typeface="+mn-cs"/>
+                        </a:rPr>
+                        <a:t>NUMBER(23,20)</a:t>
+                      </a:r>
+                      <a:endParaRPr lang="ko-KR" altLang="en-US" sz="900" kern="1200" dirty="0">
+                        <a:solidFill>
+                          <a:schemeClr val="tx1"/>
+                        </a:solidFill>
+                        <a:latin typeface="나눔스퀘어_ac" panose="020B0600000101010101" pitchFamily="50" charset="-127"/>
+                        <a:ea typeface="나눔스퀘어_ac" panose="020B0600000101010101" pitchFamily="50" charset="-127"/>
+                        <a:cs typeface="+mn-cs"/>
+                      </a:endParaRPr>
+                    </a:p>
+                  </a:txBody>
+                  <a:tcPr anchor="ctr">
+                    <a:lnL w="12700" cap="flat" cmpd="sng" algn="ctr">
+                      <a:solidFill>
+                        <a:schemeClr val="tx1"/>
+                      </a:solidFill>
+                      <a:prstDash val="solid"/>
+                      <a:round/>
+                      <a:headEnd type="none" w="med" len="med"/>
+                      <a:tailEnd type="none" w="med" len="med"/>
+                    </a:lnL>
+                    <a:lnR w="12700" cap="flat" cmpd="sng" algn="ctr">
+                      <a:solidFill>
+                        <a:schemeClr val="tx1"/>
+                      </a:solidFill>
+                      <a:prstDash val="solid"/>
+                      <a:round/>
+                      <a:headEnd type="none" w="med" len="med"/>
+                      <a:tailEnd type="none" w="med" len="med"/>
+                    </a:lnR>
+                    <a:lnT w="12700" cap="flat" cmpd="sng" algn="ctr">
+                      <a:solidFill>
+                        <a:schemeClr val="tx1"/>
+                      </a:solidFill>
+                      <a:prstDash val="solid"/>
+                      <a:round/>
+                      <a:headEnd type="none" w="med" len="med"/>
+                      <a:tailEnd type="none" w="med" len="med"/>
+                    </a:lnT>
+                    <a:lnB w="12700" cap="flat" cmpd="sng" algn="ctr">
+                      <a:solidFill>
+                        <a:schemeClr val="tx1"/>
+                      </a:solidFill>
+                      <a:prstDash val="solid"/>
+                      <a:round/>
+                      <a:headEnd type="none" w="med" len="med"/>
+                      <a:tailEnd type="none" w="med" len="med"/>
+                    </a:lnB>
+                    <a:solidFill>
+                      <a:schemeClr val="bg1"/>
+                    </a:solidFill>
+                  </a:tcPr>
+                </a:tc>
+                <a:extLst>
+                  <a:ext uri="{0D108BD9-81ED-4DB2-BD59-A6C34878D82A}">
+                    <a16:rowId xmlns:a16="http://schemas.microsoft.com/office/drawing/2014/main" val="1064730880"/>
+                  </a:ext>
+                </a:extLst>
+              </a:tr>
+              <a:tr h="204124">
+                <a:tc>
+                  <a:txBody>
+                    <a:bodyPr/>
+                    <a:lstStyle/>
+                    <a:p>
+                      <a:pPr marL="0" algn="ctr" defTabSz="914400" rtl="0" eaLnBrk="1" latinLnBrk="1" hangingPunct="1"/>
+                      <a:r>
+                        <a:rPr lang="en-US" altLang="ko-KR" sz="900" u="none" kern="1200" dirty="0">
+                          <a:solidFill>
+                            <a:schemeClr val="tx1"/>
+                          </a:solidFill>
+                          <a:latin typeface="나눔스퀘어_ac" panose="020B0600000101010101" pitchFamily="50" charset="-127"/>
+                          <a:ea typeface="나눔스퀘어_ac" panose="020B0600000101010101" pitchFamily="50" charset="-127"/>
+                          <a:cs typeface="+mn-cs"/>
+                        </a:rPr>
+                        <a:t>LON</a:t>
+                      </a:r>
+                    </a:p>
+                  </a:txBody>
+                  <a:tcPr anchor="ctr">
+                    <a:lnL w="12700" cap="flat" cmpd="sng" algn="ctr">
+                      <a:solidFill>
+                        <a:schemeClr val="tx1"/>
+                      </a:solidFill>
+                      <a:prstDash val="solid"/>
+                      <a:round/>
+                      <a:headEnd type="none" w="med" len="med"/>
+                      <a:tailEnd type="none" w="med" len="med"/>
+                    </a:lnL>
+                    <a:lnR w="12700" cap="flat" cmpd="sng" algn="ctr">
+                      <a:solidFill>
+                        <a:schemeClr val="tx1"/>
+                      </a:solidFill>
+                      <a:prstDash val="solid"/>
+                      <a:round/>
+                      <a:headEnd type="none" w="med" len="med"/>
+                      <a:tailEnd type="none" w="med" len="med"/>
+                    </a:lnR>
+                    <a:lnT w="12700" cap="flat" cmpd="sng" algn="ctr">
+                      <a:solidFill>
+                        <a:schemeClr val="tx1"/>
+                      </a:solidFill>
+                      <a:prstDash val="solid"/>
+                      <a:round/>
+                      <a:headEnd type="none" w="med" len="med"/>
+                      <a:tailEnd type="none" w="med" len="med"/>
+                    </a:lnT>
+                    <a:lnB w="12700" cap="flat" cmpd="sng" algn="ctr">
+                      <a:solidFill>
+                        <a:schemeClr val="tx1"/>
+                      </a:solidFill>
+                      <a:prstDash val="solid"/>
+                      <a:round/>
+                      <a:headEnd type="none" w="med" len="med"/>
+                      <a:tailEnd type="none" w="med" len="med"/>
+                    </a:lnB>
+                    <a:solidFill>
+                      <a:schemeClr val="bg1"/>
+                    </a:solidFill>
+                  </a:tcPr>
+                </a:tc>
+                <a:tc>
+                  <a:txBody>
+                    <a:bodyPr/>
+                    <a:lstStyle/>
+                    <a:p>
+                      <a:pPr marL="0" marR="0" lvl="0" indent="0" algn="ctr" defTabSz="685800" rtl="0" eaLnBrk="1" fontAlgn="auto" latinLnBrk="1" hangingPunct="1">
+                        <a:lnSpc>
+                          <a:spcPct val="100000"/>
+                        </a:lnSpc>
+                        <a:spcBef>
+                          <a:spcPts val="0"/>
+                        </a:spcBef>
+                        <a:spcAft>
+                          <a:spcPts val="0"/>
+                        </a:spcAft>
+                        <a:buClrTx/>
+                        <a:buSzTx/>
+                        <a:buFontTx/>
+                        <a:buNone/>
+                        <a:tabLst/>
+                        <a:defRPr/>
+                      </a:pPr>
+                      <a:endParaRPr lang="ko-KR" altLang="en-US" sz="900" kern="1200" dirty="0">
+                        <a:solidFill>
+                          <a:schemeClr val="tx1"/>
+                        </a:solidFill>
+                        <a:latin typeface="나눔스퀘어_ac" panose="020B0600000101010101" pitchFamily="50" charset="-127"/>
+                        <a:ea typeface="나눔스퀘어_ac" panose="020B0600000101010101" pitchFamily="50" charset="-127"/>
+                        <a:cs typeface="+mn-cs"/>
+                      </a:endParaRPr>
+                    </a:p>
+                  </a:txBody>
+                  <a:tcPr anchor="ctr">
+                    <a:lnL w="12700" cap="flat" cmpd="sng" algn="ctr">
+                      <a:solidFill>
+                        <a:schemeClr val="tx1"/>
+                      </a:solidFill>
+                      <a:prstDash val="solid"/>
+                      <a:round/>
+                      <a:headEnd type="none" w="med" len="med"/>
+                      <a:tailEnd type="none" w="med" len="med"/>
+                    </a:lnL>
+                    <a:lnR w="12700" cap="flat" cmpd="sng" algn="ctr">
+                      <a:solidFill>
+                        <a:schemeClr val="tx1"/>
+                      </a:solidFill>
+                      <a:prstDash val="solid"/>
+                      <a:round/>
+                      <a:headEnd type="none" w="med" len="med"/>
+                      <a:tailEnd type="none" w="med" len="med"/>
+                    </a:lnR>
+                    <a:lnT w="12700" cap="flat" cmpd="sng" algn="ctr">
+                      <a:solidFill>
+                        <a:schemeClr val="tx1"/>
+                      </a:solidFill>
+                      <a:prstDash val="solid"/>
+                      <a:round/>
+                      <a:headEnd type="none" w="med" len="med"/>
+                      <a:tailEnd type="none" w="med" len="med"/>
+                    </a:lnT>
+                    <a:lnB w="12700" cap="flat" cmpd="sng" algn="ctr">
+                      <a:solidFill>
+                        <a:schemeClr val="tx1"/>
+                      </a:solidFill>
+                      <a:prstDash val="solid"/>
+                      <a:round/>
+                      <a:headEnd type="none" w="med" len="med"/>
+                      <a:tailEnd type="none" w="med" len="med"/>
+                    </a:lnB>
+                    <a:solidFill>
+                      <a:schemeClr val="bg1"/>
+                    </a:solidFill>
+                  </a:tcPr>
+                </a:tc>
+                <a:tc>
+                  <a:txBody>
+                    <a:bodyPr/>
+                    <a:lstStyle/>
+                    <a:p>
+                      <a:pPr marL="0" marR="0" lvl="0" indent="0" algn="ctr" defTabSz="685800" rtl="0" eaLnBrk="1" fontAlgn="auto" latinLnBrk="1" hangingPunct="1">
+                        <a:lnSpc>
+                          <a:spcPct val="100000"/>
+                        </a:lnSpc>
+                        <a:spcBef>
+                          <a:spcPts val="0"/>
+                        </a:spcBef>
+                        <a:spcAft>
+                          <a:spcPts val="0"/>
+                        </a:spcAft>
+                        <a:buClrTx/>
+                        <a:buSzTx/>
+                        <a:buFontTx/>
+                        <a:buNone/>
+                        <a:tabLst/>
+                        <a:defRPr/>
+                      </a:pPr>
+                      <a:r>
+                        <a:rPr lang="en-US" altLang="ko-KR" sz="900" kern="1200" dirty="0">
+                          <a:solidFill>
+                            <a:schemeClr val="tx1"/>
+                          </a:solidFill>
+                          <a:latin typeface="나눔스퀘어_ac" panose="020B0600000101010101" pitchFamily="50" charset="-127"/>
+                          <a:ea typeface="나눔스퀘어_ac" panose="020B0600000101010101" pitchFamily="50" charset="-127"/>
+                          <a:cs typeface="+mn-cs"/>
+                        </a:rPr>
+                        <a:t>NUMBER(23,20)</a:t>
+                      </a:r>
+                      <a:endParaRPr lang="ko-KR" altLang="en-US" sz="900" kern="1200" dirty="0">
+                        <a:solidFill>
+                          <a:schemeClr val="tx1"/>
+                        </a:solidFill>
+                        <a:latin typeface="나눔스퀘어_ac" panose="020B0600000101010101" pitchFamily="50" charset="-127"/>
+                        <a:ea typeface="나눔스퀘어_ac" panose="020B0600000101010101" pitchFamily="50" charset="-127"/>
+                        <a:cs typeface="+mn-cs"/>
+                      </a:endParaRPr>
+                    </a:p>
+                  </a:txBody>
+                  <a:tcPr anchor="ctr">
+                    <a:lnL w="12700" cap="flat" cmpd="sng" algn="ctr">
+                      <a:solidFill>
+                        <a:schemeClr val="tx1"/>
+                      </a:solidFill>
+                      <a:prstDash val="solid"/>
+                      <a:round/>
+                      <a:headEnd type="none" w="med" len="med"/>
+                      <a:tailEnd type="none" w="med" len="med"/>
+                    </a:lnL>
+                    <a:lnR w="12700" cap="flat" cmpd="sng" algn="ctr">
+                      <a:solidFill>
+                        <a:schemeClr val="tx1"/>
+                      </a:solidFill>
+                      <a:prstDash val="solid"/>
+                      <a:round/>
+                      <a:headEnd type="none" w="med" len="med"/>
+                      <a:tailEnd type="none" w="med" len="med"/>
+                    </a:lnR>
+                    <a:lnT w="12700" cap="flat" cmpd="sng" algn="ctr">
+                      <a:solidFill>
+                        <a:schemeClr val="tx1"/>
+                      </a:solidFill>
+                      <a:prstDash val="solid"/>
+                      <a:round/>
+                      <a:headEnd type="none" w="med" len="med"/>
+                      <a:tailEnd type="none" w="med" len="med"/>
+                    </a:lnT>
+                    <a:lnB w="12700" cap="flat" cmpd="sng" algn="ctr">
+                      <a:solidFill>
+                        <a:schemeClr val="tx1"/>
+                      </a:solidFill>
+                      <a:prstDash val="solid"/>
+                      <a:round/>
+                      <a:headEnd type="none" w="med" len="med"/>
+                      <a:tailEnd type="none" w="med" len="med"/>
+                    </a:lnB>
+                    <a:solidFill>
+                      <a:schemeClr val="bg1"/>
+                    </a:solidFill>
+                  </a:tcPr>
+                </a:tc>
+                <a:extLst>
+                  <a:ext uri="{0D108BD9-81ED-4DB2-BD59-A6C34878D82A}">
+                    <a16:rowId xmlns:a16="http://schemas.microsoft.com/office/drawing/2014/main" val="3455978621"/>
                   </a:ext>
                 </a:extLst>
               </a:tr>

</xml_diff>